<commit_message>
Mostly done needs summary
</commit_message>
<xml_diff>
--- a/tex/figures/SpecialRelativity/Figures.pptx
+++ b/tex/figures/SpecialRelativity/Figures.pptx
@@ -205,7 +205,7 @@
           <a:p>
             <a:fld id="{FA15A6B2-55AC-CD4B-A1E6-BB01091FE9DC}" type="datetimeFigureOut">
               <a:rPr lang="en-US" smtClean="0"/>
-              <a:t>8/7/2019</a:t>
+              <a:t>8/8/2019</a:t>
             </a:fld>
             <a:endParaRPr lang="en-US"/>
           </a:p>
@@ -603,7 +603,7 @@
           <a:p>
             <a:fld id="{F7249F8D-641B-4CAF-BAE5-10524742F6F1}" type="datetimeFigureOut">
               <a:rPr lang="en-CA" smtClean="0"/>
-              <a:t>2019-08-07</a:t>
+              <a:t>2019-08-08</a:t>
             </a:fld>
             <a:endParaRPr lang="en-CA"/>
           </a:p>
@@ -773,7 +773,7 @@
           <a:p>
             <a:fld id="{F7249F8D-641B-4CAF-BAE5-10524742F6F1}" type="datetimeFigureOut">
               <a:rPr lang="en-CA" smtClean="0"/>
-              <a:t>2019-08-07</a:t>
+              <a:t>2019-08-08</a:t>
             </a:fld>
             <a:endParaRPr lang="en-CA"/>
           </a:p>
@@ -953,7 +953,7 @@
           <a:p>
             <a:fld id="{F7249F8D-641B-4CAF-BAE5-10524742F6F1}" type="datetimeFigureOut">
               <a:rPr lang="en-CA" smtClean="0"/>
-              <a:t>2019-08-07</a:t>
+              <a:t>2019-08-08</a:t>
             </a:fld>
             <a:endParaRPr lang="en-CA"/>
           </a:p>
@@ -1123,7 +1123,7 @@
           <a:p>
             <a:fld id="{F7249F8D-641B-4CAF-BAE5-10524742F6F1}" type="datetimeFigureOut">
               <a:rPr lang="en-CA" smtClean="0"/>
-              <a:t>2019-08-07</a:t>
+              <a:t>2019-08-08</a:t>
             </a:fld>
             <a:endParaRPr lang="en-CA"/>
           </a:p>
@@ -1369,7 +1369,7 @@
           <a:p>
             <a:fld id="{F7249F8D-641B-4CAF-BAE5-10524742F6F1}" type="datetimeFigureOut">
               <a:rPr lang="en-CA" smtClean="0"/>
-              <a:t>2019-08-07</a:t>
+              <a:t>2019-08-08</a:t>
             </a:fld>
             <a:endParaRPr lang="en-CA"/>
           </a:p>
@@ -1601,7 +1601,7 @@
           <a:p>
             <a:fld id="{F7249F8D-641B-4CAF-BAE5-10524742F6F1}" type="datetimeFigureOut">
               <a:rPr lang="en-CA" smtClean="0"/>
-              <a:t>2019-08-07</a:t>
+              <a:t>2019-08-08</a:t>
             </a:fld>
             <a:endParaRPr lang="en-CA"/>
           </a:p>
@@ -1968,7 +1968,7 @@
           <a:p>
             <a:fld id="{F7249F8D-641B-4CAF-BAE5-10524742F6F1}" type="datetimeFigureOut">
               <a:rPr lang="en-CA" smtClean="0"/>
-              <a:t>2019-08-07</a:t>
+              <a:t>2019-08-08</a:t>
             </a:fld>
             <a:endParaRPr lang="en-CA"/>
           </a:p>
@@ -2086,7 +2086,7 @@
           <a:p>
             <a:fld id="{F7249F8D-641B-4CAF-BAE5-10524742F6F1}" type="datetimeFigureOut">
               <a:rPr lang="en-CA" smtClean="0"/>
-              <a:t>2019-08-07</a:t>
+              <a:t>2019-08-08</a:t>
             </a:fld>
             <a:endParaRPr lang="en-CA"/>
           </a:p>
@@ -2181,7 +2181,7 @@
           <a:p>
             <a:fld id="{F7249F8D-641B-4CAF-BAE5-10524742F6F1}" type="datetimeFigureOut">
               <a:rPr lang="en-CA" smtClean="0"/>
-              <a:t>2019-08-07</a:t>
+              <a:t>2019-08-08</a:t>
             </a:fld>
             <a:endParaRPr lang="en-CA"/>
           </a:p>
@@ -2458,7 +2458,7 @@
           <a:p>
             <a:fld id="{F7249F8D-641B-4CAF-BAE5-10524742F6F1}" type="datetimeFigureOut">
               <a:rPr lang="en-CA" smtClean="0"/>
-              <a:t>2019-08-07</a:t>
+              <a:t>2019-08-08</a:t>
             </a:fld>
             <a:endParaRPr lang="en-CA"/>
           </a:p>
@@ -2711,7 +2711,7 @@
           <a:p>
             <a:fld id="{F7249F8D-641B-4CAF-BAE5-10524742F6F1}" type="datetimeFigureOut">
               <a:rPr lang="en-CA" smtClean="0"/>
-              <a:t>2019-08-07</a:t>
+              <a:t>2019-08-08</a:t>
             </a:fld>
             <a:endParaRPr lang="en-CA"/>
           </a:p>
@@ -2924,7 +2924,7 @@
           <a:p>
             <a:fld id="{F7249F8D-641B-4CAF-BAE5-10524742F6F1}" type="datetimeFigureOut">
               <a:rPr lang="en-CA" smtClean="0"/>
-              <a:t>2019-08-07</a:t>
+              <a:t>2019-08-08</a:t>
             </a:fld>
             <a:endParaRPr lang="en-CA"/>
           </a:p>
@@ -30142,8 +30142,8 @@
                 </a:fontRef>
               </p:style>
             </p:cxnSp>
-            <mc:AlternateContent xmlns:mc="http://schemas.openxmlformats.org/markup-compatibility/2006">
-              <mc:Choice xmlns:a14="http://schemas.microsoft.com/office/drawing/2010/main" Requires="a14">
+            <mc:AlternateContent xmlns:mc="http://schemas.openxmlformats.org/markup-compatibility/2006" xmlns:a14="http://schemas.microsoft.com/office/drawing/2010/main">
+              <mc:Choice Requires="a14">
                 <p:sp>
                   <p:nvSpPr>
                     <p:cNvPr id="21" name="Rectangle 20"/>
@@ -30187,7 +30187,7 @@
                   </p:txBody>
                 </p:sp>
               </mc:Choice>
-              <mc:Fallback>
+              <mc:Fallback xmlns="">
                 <p:sp>
                   <p:nvSpPr>
                     <p:cNvPr id="21" name="Rectangle 20"/>
@@ -30226,8 +30226,8 @@
                 </p:sp>
               </mc:Fallback>
             </mc:AlternateContent>
-            <mc:AlternateContent xmlns:mc="http://schemas.openxmlformats.org/markup-compatibility/2006">
-              <mc:Choice xmlns:a14="http://schemas.microsoft.com/office/drawing/2010/main" Requires="a14">
+            <mc:AlternateContent xmlns:mc="http://schemas.openxmlformats.org/markup-compatibility/2006" xmlns:a14="http://schemas.microsoft.com/office/drawing/2010/main">
+              <mc:Choice Requires="a14">
                 <p:sp>
                   <p:nvSpPr>
                     <p:cNvPr id="22" name="Rectangle 21"/>
@@ -30270,7 +30270,7 @@
                   </p:txBody>
                 </p:sp>
               </mc:Choice>
-              <mc:Fallback>
+              <mc:Fallback xmlns="">
                 <p:sp>
                   <p:nvSpPr>
                     <p:cNvPr id="22" name="Rectangle 21"/>
@@ -30492,8 +30492,8 @@
             </a:fontRef>
           </p:style>
         </p:cxnSp>
-        <mc:AlternateContent xmlns:mc="http://schemas.openxmlformats.org/markup-compatibility/2006">
-          <mc:Choice xmlns:a14="http://schemas.microsoft.com/office/drawing/2010/main" Requires="a14">
+        <mc:AlternateContent xmlns:mc="http://schemas.openxmlformats.org/markup-compatibility/2006" xmlns:a14="http://schemas.microsoft.com/office/drawing/2010/main">
+          <mc:Choice Requires="a14">
             <p:sp>
               <p:nvSpPr>
                 <p:cNvPr id="35" name="Rectangle 34"/>
@@ -30552,7 +30552,7 @@
               </p:txBody>
             </p:sp>
           </mc:Choice>
-          <mc:Fallback>
+          <mc:Fallback xmlns="">
             <p:sp>
               <p:nvSpPr>
                 <p:cNvPr id="35" name="Rectangle 34"/>
@@ -30591,8 +30591,8 @@
             </p:sp>
           </mc:Fallback>
         </mc:AlternateContent>
-        <mc:AlternateContent xmlns:mc="http://schemas.openxmlformats.org/markup-compatibility/2006">
-          <mc:Choice xmlns:a14="http://schemas.microsoft.com/office/drawing/2010/main" Requires="a14">
+        <mc:AlternateContent xmlns:mc="http://schemas.openxmlformats.org/markup-compatibility/2006" xmlns:a14="http://schemas.microsoft.com/office/drawing/2010/main">
+          <mc:Choice Requires="a14">
             <p:sp>
               <p:nvSpPr>
                 <p:cNvPr id="36" name="Rectangle 35"/>
@@ -30653,7 +30653,7 @@
               </p:txBody>
             </p:sp>
           </mc:Choice>
-          <mc:Fallback>
+          <mc:Fallback xmlns="">
             <p:sp>
               <p:nvSpPr>
                 <p:cNvPr id="36" name="Rectangle 35"/>
@@ -30773,8 +30773,8 @@
             </a:p>
           </p:txBody>
         </p:sp>
-        <mc:AlternateContent xmlns:mc="http://schemas.openxmlformats.org/markup-compatibility/2006">
-          <mc:Choice xmlns:a14="http://schemas.microsoft.com/office/drawing/2010/main" Requires="a14">
+        <mc:AlternateContent xmlns:mc="http://schemas.openxmlformats.org/markup-compatibility/2006" xmlns:a14="http://schemas.microsoft.com/office/drawing/2010/main">
+          <mc:Choice Requires="a14">
             <p:sp>
               <p:nvSpPr>
                 <p:cNvPr id="42" name="TextBox 41"/>
@@ -30797,6 +30797,7 @@
                 </a:bodyPr>
                 <a:lstStyle/>
                 <a:p>
+                  <a:pPr/>
                   <a14:m>
                     <m:oMathPara xmlns:m="http://schemas.openxmlformats.org/officeDocument/2006/math">
                       <m:oMathParaPr>
@@ -30856,7 +30857,7 @@
               </p:txBody>
             </p:sp>
           </mc:Choice>
-          <mc:Fallback>
+          <mc:Fallback xmlns="">
             <p:sp>
               <p:nvSpPr>
                 <p:cNvPr id="42" name="TextBox 41"/>
@@ -30895,8 +30896,8 @@
             </p:sp>
           </mc:Fallback>
         </mc:AlternateContent>
-        <mc:AlternateContent xmlns:mc="http://schemas.openxmlformats.org/markup-compatibility/2006">
-          <mc:Choice xmlns:a14="http://schemas.microsoft.com/office/drawing/2010/main" Requires="a14">
+        <mc:AlternateContent xmlns:mc="http://schemas.openxmlformats.org/markup-compatibility/2006" xmlns:a14="http://schemas.microsoft.com/office/drawing/2010/main">
+          <mc:Choice Requires="a14">
             <p:sp>
               <p:nvSpPr>
                 <p:cNvPr id="43" name="Rectangle 42"/>
@@ -30918,6 +30919,7 @@
                 </a:bodyPr>
                 <a:lstStyle/>
                 <a:p>
+                  <a:pPr/>
                   <a14:m>
                     <m:oMathPara xmlns:m="http://schemas.openxmlformats.org/officeDocument/2006/math">
                       <m:oMathParaPr>
@@ -30939,7 +30941,7 @@
               </p:txBody>
             </p:sp>
           </mc:Choice>
-          <mc:Fallback>
+          <mc:Fallback xmlns="">
             <p:sp>
               <p:nvSpPr>
                 <p:cNvPr id="43" name="Rectangle 42"/>
@@ -30978,8 +30980,8 @@
             </p:sp>
           </mc:Fallback>
         </mc:AlternateContent>
-        <mc:AlternateContent xmlns:mc="http://schemas.openxmlformats.org/markup-compatibility/2006">
-          <mc:Choice xmlns:a14="http://schemas.microsoft.com/office/drawing/2010/main" Requires="a14">
+        <mc:AlternateContent xmlns:mc="http://schemas.openxmlformats.org/markup-compatibility/2006" xmlns:a14="http://schemas.microsoft.com/office/drawing/2010/main">
+          <mc:Choice Requires="a14">
             <p:sp>
               <p:nvSpPr>
                 <p:cNvPr id="45" name="TextBox 44"/>
@@ -31002,6 +31004,7 @@
                 </a:bodyPr>
                 <a:lstStyle/>
                 <a:p>
+                  <a:pPr/>
                   <a14:m>
                     <m:oMathPara xmlns:m="http://schemas.openxmlformats.org/officeDocument/2006/math">
                       <m:oMathParaPr>
@@ -31026,7 +31029,7 @@
               </p:txBody>
             </p:sp>
           </mc:Choice>
-          <mc:Fallback>
+          <mc:Fallback xmlns="">
             <p:sp>
               <p:nvSpPr>
                 <p:cNvPr id="45" name="TextBox 44"/>
@@ -31065,8 +31068,8 @@
             </p:sp>
           </mc:Fallback>
         </mc:AlternateContent>
-        <mc:AlternateContent xmlns:mc="http://schemas.openxmlformats.org/markup-compatibility/2006">
-          <mc:Choice xmlns:a14="http://schemas.microsoft.com/office/drawing/2010/main" Requires="a14">
+        <mc:AlternateContent xmlns:mc="http://schemas.openxmlformats.org/markup-compatibility/2006" xmlns:a14="http://schemas.microsoft.com/office/drawing/2010/main">
+          <mc:Choice Requires="a14">
             <p:sp>
               <p:nvSpPr>
                 <p:cNvPr id="46" name="TextBox 45"/>
@@ -31089,6 +31092,7 @@
                 </a:bodyPr>
                 <a:lstStyle/>
                 <a:p>
+                  <a:pPr/>
                   <a14:m>
                     <m:oMathPara xmlns:m="http://schemas.openxmlformats.org/officeDocument/2006/math">
                       <m:oMathParaPr>
@@ -31113,7 +31117,7 @@
               </p:txBody>
             </p:sp>
           </mc:Choice>
-          <mc:Fallback>
+          <mc:Fallback xmlns="">
             <p:sp>
               <p:nvSpPr>
                 <p:cNvPr id="46" name="TextBox 45"/>
@@ -31296,8 +31300,8 @@
             </a:fontRef>
           </p:style>
         </p:cxnSp>
-        <mc:AlternateContent xmlns:mc="http://schemas.openxmlformats.org/markup-compatibility/2006">
-          <mc:Choice xmlns:a14="http://schemas.microsoft.com/office/drawing/2010/main" Requires="a14">
+        <mc:AlternateContent xmlns:mc="http://schemas.openxmlformats.org/markup-compatibility/2006" xmlns:a14="http://schemas.microsoft.com/office/drawing/2010/main">
+          <mc:Choice Requires="a14">
             <p:sp>
               <p:nvSpPr>
                 <p:cNvPr id="60" name="Rectangle 59"/>
@@ -31385,7 +31389,7 @@
               </p:txBody>
             </p:sp>
           </mc:Choice>
-          <mc:Fallback>
+          <mc:Fallback xmlns="">
             <p:sp>
               <p:nvSpPr>
                 <p:cNvPr id="60" name="Rectangle 59"/>
@@ -31424,8 +31428,8 @@
             </p:sp>
           </mc:Fallback>
         </mc:AlternateContent>
-        <mc:AlternateContent xmlns:mc="http://schemas.openxmlformats.org/markup-compatibility/2006">
-          <mc:Choice xmlns:a14="http://schemas.microsoft.com/office/drawing/2010/main" Requires="a14">
+        <mc:AlternateContent xmlns:mc="http://schemas.openxmlformats.org/markup-compatibility/2006" xmlns:a14="http://schemas.microsoft.com/office/drawing/2010/main">
+          <mc:Choice Requires="a14">
             <p:sp>
               <p:nvSpPr>
                 <p:cNvPr id="61" name="Rectangle 60"/>
@@ -31513,7 +31517,7 @@
               </p:txBody>
             </p:sp>
           </mc:Choice>
-          <mc:Fallback>
+          <mc:Fallback xmlns="">
             <p:sp>
               <p:nvSpPr>
                 <p:cNvPr id="61" name="Rectangle 60"/>
@@ -31552,8 +31556,8 @@
             </p:sp>
           </mc:Fallback>
         </mc:AlternateContent>
-        <mc:AlternateContent xmlns:mc="http://schemas.openxmlformats.org/markup-compatibility/2006">
-          <mc:Choice xmlns:a14="http://schemas.microsoft.com/office/drawing/2010/main" Requires="a14">
+        <mc:AlternateContent xmlns:mc="http://schemas.openxmlformats.org/markup-compatibility/2006" xmlns:a14="http://schemas.microsoft.com/office/drawing/2010/main">
+          <mc:Choice Requires="a14">
             <p:sp>
               <p:nvSpPr>
                 <p:cNvPr id="62" name="Rectangle 61"/>
@@ -31653,7 +31657,7 @@
               </p:txBody>
             </p:sp>
           </mc:Choice>
-          <mc:Fallback>
+          <mc:Fallback xmlns="">
             <p:sp>
               <p:nvSpPr>
                 <p:cNvPr id="62" name="Rectangle 61"/>
@@ -31692,8 +31696,8 @@
             </p:sp>
           </mc:Fallback>
         </mc:AlternateContent>
-        <mc:AlternateContent xmlns:mc="http://schemas.openxmlformats.org/markup-compatibility/2006">
-          <mc:Choice xmlns:a14="http://schemas.microsoft.com/office/drawing/2010/main" Requires="a14">
+        <mc:AlternateContent xmlns:mc="http://schemas.openxmlformats.org/markup-compatibility/2006" xmlns:a14="http://schemas.microsoft.com/office/drawing/2010/main">
+          <mc:Choice Requires="a14">
             <p:sp>
               <p:nvSpPr>
                 <p:cNvPr id="63" name="Rectangle 62"/>
@@ -31793,7 +31797,7 @@
               </p:txBody>
             </p:sp>
           </mc:Choice>
-          <mc:Fallback>
+          <mc:Fallback xmlns="">
             <p:sp>
               <p:nvSpPr>
                 <p:cNvPr id="63" name="Rectangle 62"/>
@@ -31984,8 +31988,8 @@
             </a:fontRef>
           </p:style>
         </p:cxnSp>
-        <mc:AlternateContent xmlns:mc="http://schemas.openxmlformats.org/markup-compatibility/2006">
-          <mc:Choice xmlns:a14="http://schemas.microsoft.com/office/drawing/2010/main" Requires="a14">
+        <mc:AlternateContent xmlns:mc="http://schemas.openxmlformats.org/markup-compatibility/2006" xmlns:a14="http://schemas.microsoft.com/office/drawing/2010/main">
+          <mc:Choice Requires="a14">
             <p:sp>
               <p:nvSpPr>
                 <p:cNvPr id="74" name="Rectangle 73"/>
@@ -32050,7 +32054,7 @@
               </p:txBody>
             </p:sp>
           </mc:Choice>
-          <mc:Fallback>
+          <mc:Fallback xmlns="">
             <p:sp>
               <p:nvSpPr>
                 <p:cNvPr id="74" name="Rectangle 73"/>
@@ -32089,8 +32093,8 @@
             </p:sp>
           </mc:Fallback>
         </mc:AlternateContent>
-        <mc:AlternateContent xmlns:mc="http://schemas.openxmlformats.org/markup-compatibility/2006">
-          <mc:Choice xmlns:a14="http://schemas.microsoft.com/office/drawing/2010/main" Requires="a14">
+        <mc:AlternateContent xmlns:mc="http://schemas.openxmlformats.org/markup-compatibility/2006" xmlns:a14="http://schemas.microsoft.com/office/drawing/2010/main">
+          <mc:Choice Requires="a14">
             <p:sp>
               <p:nvSpPr>
                 <p:cNvPr id="75" name="Rectangle 74"/>
@@ -32155,7 +32159,7 @@
               </p:txBody>
             </p:sp>
           </mc:Choice>
-          <mc:Fallback>
+          <mc:Fallback xmlns="">
             <p:sp>
               <p:nvSpPr>
                 <p:cNvPr id="75" name="Rectangle 74"/>
@@ -32194,8 +32198,8 @@
             </p:sp>
           </mc:Fallback>
         </mc:AlternateContent>
-        <mc:AlternateContent xmlns:mc="http://schemas.openxmlformats.org/markup-compatibility/2006">
-          <mc:Choice xmlns:a14="http://schemas.microsoft.com/office/drawing/2010/main" Requires="a14">
+        <mc:AlternateContent xmlns:mc="http://schemas.openxmlformats.org/markup-compatibility/2006" xmlns:a14="http://schemas.microsoft.com/office/drawing/2010/main">
+          <mc:Choice Requires="a14">
             <p:sp>
               <p:nvSpPr>
                 <p:cNvPr id="76" name="Rectangle 75"/>
@@ -32267,7 +32271,7 @@
               </p:txBody>
             </p:sp>
           </mc:Choice>
-          <mc:Fallback>
+          <mc:Fallback xmlns="">
             <p:sp>
               <p:nvSpPr>
                 <p:cNvPr id="76" name="Rectangle 75"/>
@@ -32306,8 +32310,8 @@
             </p:sp>
           </mc:Fallback>
         </mc:AlternateContent>
-        <mc:AlternateContent xmlns:mc="http://schemas.openxmlformats.org/markup-compatibility/2006">
-          <mc:Choice xmlns:a14="http://schemas.microsoft.com/office/drawing/2010/main" Requires="a14">
+        <mc:AlternateContent xmlns:mc="http://schemas.openxmlformats.org/markup-compatibility/2006" xmlns:a14="http://schemas.microsoft.com/office/drawing/2010/main">
+          <mc:Choice Requires="a14">
             <p:sp>
               <p:nvSpPr>
                 <p:cNvPr id="77" name="Rectangle 76"/>
@@ -32379,7 +32383,7 @@
               </p:txBody>
             </p:sp>
           </mc:Choice>
-          <mc:Fallback>
+          <mc:Fallback xmlns="">
             <p:sp>
               <p:nvSpPr>
                 <p:cNvPr id="77" name="Rectangle 76"/>
@@ -32418,8 +32422,8 @@
             </p:sp>
           </mc:Fallback>
         </mc:AlternateContent>
-        <mc:AlternateContent xmlns:mc="http://schemas.openxmlformats.org/markup-compatibility/2006">
-          <mc:Choice xmlns:a14="http://schemas.microsoft.com/office/drawing/2010/main" Requires="a14">
+        <mc:AlternateContent xmlns:mc="http://schemas.openxmlformats.org/markup-compatibility/2006" xmlns:a14="http://schemas.microsoft.com/office/drawing/2010/main">
+          <mc:Choice Requires="a14">
             <p:sp>
               <p:nvSpPr>
                 <p:cNvPr id="78" name="TextBox 77"/>
@@ -32466,18 +32470,11 @@
                     </a:rPr>
                     <a:t>’</a:t>
                   </a:r>
-                  <a:endParaRPr lang="en-US" sz="2000" dirty="0" smtClean="0">
-                    <a:solidFill>
-                      <a:srgbClr val="FF0000"/>
-                    </a:solidFill>
-                    <a:latin typeface="Arial" panose="020B0604020202020204" pitchFamily="34" charset="0"/>
-                    <a:cs typeface="Arial" panose="020B0604020202020204" pitchFamily="34" charset="0"/>
-                  </a:endParaRPr>
                 </a:p>
               </p:txBody>
             </p:sp>
           </mc:Choice>
-          <mc:Fallback>
+          <mc:Fallback xmlns="">
             <p:sp>
               <p:nvSpPr>
                 <p:cNvPr id="78" name="TextBox 77"/>
@@ -32516,8 +32513,8 @@
             </p:sp>
           </mc:Fallback>
         </mc:AlternateContent>
-        <mc:AlternateContent xmlns:mc="http://schemas.openxmlformats.org/markup-compatibility/2006">
-          <mc:Choice xmlns:a14="http://schemas.microsoft.com/office/drawing/2010/main" Requires="a14">
+        <mc:AlternateContent xmlns:mc="http://schemas.openxmlformats.org/markup-compatibility/2006" xmlns:a14="http://schemas.microsoft.com/office/drawing/2010/main">
+          <mc:Choice Requires="a14">
             <p:sp>
               <p:nvSpPr>
                 <p:cNvPr id="79" name="TextBox 78"/>
@@ -32540,6 +32537,7 @@
                 </a:bodyPr>
                 <a:lstStyle/>
                 <a:p>
+                  <a:pPr/>
                   <a14:m>
                     <m:oMathPara xmlns:m="http://schemas.openxmlformats.org/officeDocument/2006/math">
                       <m:oMathParaPr>
@@ -32564,7 +32562,7 @@
               </p:txBody>
             </p:sp>
           </mc:Choice>
-          <mc:Fallback>
+          <mc:Fallback xmlns="">
             <p:sp>
               <p:nvSpPr>
                 <p:cNvPr id="79" name="TextBox 78"/>
@@ -32718,8 +32716,8 @@
                 </a:fontRef>
               </p:style>
             </p:cxnSp>
-            <mc:AlternateContent xmlns:mc="http://schemas.openxmlformats.org/markup-compatibility/2006">
-              <mc:Choice xmlns:a14="http://schemas.microsoft.com/office/drawing/2010/main" Requires="a14">
+            <mc:AlternateContent xmlns:mc="http://schemas.openxmlformats.org/markup-compatibility/2006" xmlns:a14="http://schemas.microsoft.com/office/drawing/2010/main">
+              <mc:Choice Requires="a14">
                 <p:sp>
                   <p:nvSpPr>
                     <p:cNvPr id="115" name="Rectangle 114"/>
@@ -32763,7 +32761,7 @@
                   </p:txBody>
                 </p:sp>
               </mc:Choice>
-              <mc:Fallback>
+              <mc:Fallback xmlns="">
                 <p:sp>
                   <p:nvSpPr>
                     <p:cNvPr id="115" name="Rectangle 114"/>
@@ -32802,8 +32800,8 @@
                 </p:sp>
               </mc:Fallback>
             </mc:AlternateContent>
-            <mc:AlternateContent xmlns:mc="http://schemas.openxmlformats.org/markup-compatibility/2006">
-              <mc:Choice xmlns:a14="http://schemas.microsoft.com/office/drawing/2010/main" Requires="a14">
+            <mc:AlternateContent xmlns:mc="http://schemas.openxmlformats.org/markup-compatibility/2006" xmlns:a14="http://schemas.microsoft.com/office/drawing/2010/main">
+              <mc:Choice Requires="a14">
                 <p:sp>
                   <p:nvSpPr>
                     <p:cNvPr id="116" name="Rectangle 115"/>
@@ -32846,7 +32844,7 @@
                   </p:txBody>
                 </p:sp>
               </mc:Choice>
-              <mc:Fallback>
+              <mc:Fallback xmlns="">
                 <p:sp>
                   <p:nvSpPr>
                     <p:cNvPr id="116" name="Rectangle 115"/>
@@ -33068,8 +33066,8 @@
             </a:fontRef>
           </p:style>
         </p:cxnSp>
-        <mc:AlternateContent xmlns:mc="http://schemas.openxmlformats.org/markup-compatibility/2006">
-          <mc:Choice xmlns:a14="http://schemas.microsoft.com/office/drawing/2010/main" Requires="a14">
+        <mc:AlternateContent xmlns:mc="http://schemas.openxmlformats.org/markup-compatibility/2006" xmlns:a14="http://schemas.microsoft.com/office/drawing/2010/main">
+          <mc:Choice Requires="a14">
             <p:sp>
               <p:nvSpPr>
                 <p:cNvPr id="85" name="Rectangle 84"/>
@@ -33128,7 +33126,7 @@
               </p:txBody>
             </p:sp>
           </mc:Choice>
-          <mc:Fallback>
+          <mc:Fallback xmlns="">
             <p:sp>
               <p:nvSpPr>
                 <p:cNvPr id="85" name="Rectangle 84"/>
@@ -33167,8 +33165,8 @@
             </p:sp>
           </mc:Fallback>
         </mc:AlternateContent>
-        <mc:AlternateContent xmlns:mc="http://schemas.openxmlformats.org/markup-compatibility/2006">
-          <mc:Choice xmlns:a14="http://schemas.microsoft.com/office/drawing/2010/main" Requires="a14">
+        <mc:AlternateContent xmlns:mc="http://schemas.openxmlformats.org/markup-compatibility/2006" xmlns:a14="http://schemas.microsoft.com/office/drawing/2010/main">
+          <mc:Choice Requires="a14">
             <p:sp>
               <p:nvSpPr>
                 <p:cNvPr id="86" name="Rectangle 85"/>
@@ -33229,7 +33227,7 @@
               </p:txBody>
             </p:sp>
           </mc:Choice>
-          <mc:Fallback>
+          <mc:Fallback xmlns="">
             <p:sp>
               <p:nvSpPr>
                 <p:cNvPr id="86" name="Rectangle 85"/>
@@ -33349,8 +33347,8 @@
             </a:p>
           </p:txBody>
         </p:sp>
-        <mc:AlternateContent xmlns:mc="http://schemas.openxmlformats.org/markup-compatibility/2006">
-          <mc:Choice xmlns:a14="http://schemas.microsoft.com/office/drawing/2010/main" Requires="a14">
+        <mc:AlternateContent xmlns:mc="http://schemas.openxmlformats.org/markup-compatibility/2006" xmlns:a14="http://schemas.microsoft.com/office/drawing/2010/main">
+          <mc:Choice Requires="a14">
             <p:sp>
               <p:nvSpPr>
                 <p:cNvPr id="89" name="TextBox 88"/>
@@ -33373,6 +33371,7 @@
                 </a:bodyPr>
                 <a:lstStyle/>
                 <a:p>
+                  <a:pPr/>
                   <a14:m>
                     <m:oMathPara xmlns:m="http://schemas.openxmlformats.org/officeDocument/2006/math">
                       <m:oMathParaPr>
@@ -33432,7 +33431,7 @@
               </p:txBody>
             </p:sp>
           </mc:Choice>
-          <mc:Fallback>
+          <mc:Fallback xmlns="">
             <p:sp>
               <p:nvSpPr>
                 <p:cNvPr id="89" name="TextBox 88"/>
@@ -33471,8 +33470,8 @@
             </p:sp>
           </mc:Fallback>
         </mc:AlternateContent>
-        <mc:AlternateContent xmlns:mc="http://schemas.openxmlformats.org/markup-compatibility/2006">
-          <mc:Choice xmlns:a14="http://schemas.microsoft.com/office/drawing/2010/main" Requires="a14">
+        <mc:AlternateContent xmlns:mc="http://schemas.openxmlformats.org/markup-compatibility/2006" xmlns:a14="http://schemas.microsoft.com/office/drawing/2010/main">
+          <mc:Choice Requires="a14">
             <p:sp>
               <p:nvSpPr>
                 <p:cNvPr id="90" name="Rectangle 89"/>
@@ -33494,6 +33493,7 @@
                 </a:bodyPr>
                 <a:lstStyle/>
                 <a:p>
+                  <a:pPr/>
                   <a14:m>
                     <m:oMathPara xmlns:m="http://schemas.openxmlformats.org/officeDocument/2006/math">
                       <m:oMathParaPr>
@@ -33515,7 +33515,7 @@
               </p:txBody>
             </p:sp>
           </mc:Choice>
-          <mc:Fallback>
+          <mc:Fallback xmlns="">
             <p:sp>
               <p:nvSpPr>
                 <p:cNvPr id="90" name="Rectangle 89"/>
@@ -33554,8 +33554,8 @@
             </p:sp>
           </mc:Fallback>
         </mc:AlternateContent>
-        <mc:AlternateContent xmlns:mc="http://schemas.openxmlformats.org/markup-compatibility/2006">
-          <mc:Choice xmlns:a14="http://schemas.microsoft.com/office/drawing/2010/main" Requires="a14">
+        <mc:AlternateContent xmlns:mc="http://schemas.openxmlformats.org/markup-compatibility/2006" xmlns:a14="http://schemas.microsoft.com/office/drawing/2010/main">
+          <mc:Choice Requires="a14">
             <p:sp>
               <p:nvSpPr>
                 <p:cNvPr id="91" name="TextBox 90"/>
@@ -33578,6 +33578,7 @@
                 </a:bodyPr>
                 <a:lstStyle/>
                 <a:p>
+                  <a:pPr/>
                   <a14:m>
                     <m:oMathPara xmlns:m="http://schemas.openxmlformats.org/officeDocument/2006/math">
                       <m:oMathParaPr>
@@ -33602,7 +33603,7 @@
               </p:txBody>
             </p:sp>
           </mc:Choice>
-          <mc:Fallback>
+          <mc:Fallback xmlns="">
             <p:sp>
               <p:nvSpPr>
                 <p:cNvPr id="91" name="TextBox 90"/>
@@ -33641,8 +33642,8 @@
             </p:sp>
           </mc:Fallback>
         </mc:AlternateContent>
-        <mc:AlternateContent xmlns:mc="http://schemas.openxmlformats.org/markup-compatibility/2006">
-          <mc:Choice xmlns:a14="http://schemas.microsoft.com/office/drawing/2010/main" Requires="a14">
+        <mc:AlternateContent xmlns:mc="http://schemas.openxmlformats.org/markup-compatibility/2006" xmlns:a14="http://schemas.microsoft.com/office/drawing/2010/main">
+          <mc:Choice Requires="a14">
             <p:sp>
               <p:nvSpPr>
                 <p:cNvPr id="92" name="TextBox 91"/>
@@ -33665,6 +33666,7 @@
                 </a:bodyPr>
                 <a:lstStyle/>
                 <a:p>
+                  <a:pPr/>
                   <a14:m>
                     <m:oMathPara xmlns:m="http://schemas.openxmlformats.org/officeDocument/2006/math">
                       <m:oMathParaPr>
@@ -33689,7 +33691,7 @@
               </p:txBody>
             </p:sp>
           </mc:Choice>
-          <mc:Fallback>
+          <mc:Fallback xmlns="">
             <p:sp>
               <p:nvSpPr>
                 <p:cNvPr id="92" name="TextBox 91"/>
@@ -33872,8 +33874,8 @@
             </a:fontRef>
           </p:style>
         </p:cxnSp>
-        <mc:AlternateContent xmlns:mc="http://schemas.openxmlformats.org/markup-compatibility/2006">
-          <mc:Choice xmlns:a14="http://schemas.microsoft.com/office/drawing/2010/main" Requires="a14">
+        <mc:AlternateContent xmlns:mc="http://schemas.openxmlformats.org/markup-compatibility/2006" xmlns:a14="http://schemas.microsoft.com/office/drawing/2010/main">
+          <mc:Choice Requires="a14">
             <p:sp>
               <p:nvSpPr>
                 <p:cNvPr id="97" name="Rectangle 96"/>
@@ -33961,7 +33963,7 @@
               </p:txBody>
             </p:sp>
           </mc:Choice>
-          <mc:Fallback>
+          <mc:Fallback xmlns="">
             <p:sp>
               <p:nvSpPr>
                 <p:cNvPr id="97" name="Rectangle 96"/>
@@ -34000,8 +34002,8 @@
             </p:sp>
           </mc:Fallback>
         </mc:AlternateContent>
-        <mc:AlternateContent xmlns:mc="http://schemas.openxmlformats.org/markup-compatibility/2006">
-          <mc:Choice xmlns:a14="http://schemas.microsoft.com/office/drawing/2010/main" Requires="a14">
+        <mc:AlternateContent xmlns:mc="http://schemas.openxmlformats.org/markup-compatibility/2006" xmlns:a14="http://schemas.microsoft.com/office/drawing/2010/main">
+          <mc:Choice Requires="a14">
             <p:sp>
               <p:nvSpPr>
                 <p:cNvPr id="98" name="Rectangle 97"/>
@@ -34089,7 +34091,7 @@
               </p:txBody>
             </p:sp>
           </mc:Choice>
-          <mc:Fallback>
+          <mc:Fallback xmlns="">
             <p:sp>
               <p:nvSpPr>
                 <p:cNvPr id="98" name="Rectangle 97"/>
@@ -34128,8 +34130,8 @@
             </p:sp>
           </mc:Fallback>
         </mc:AlternateContent>
-        <mc:AlternateContent xmlns:mc="http://schemas.openxmlformats.org/markup-compatibility/2006">
-          <mc:Choice xmlns:a14="http://schemas.microsoft.com/office/drawing/2010/main" Requires="a14">
+        <mc:AlternateContent xmlns:mc="http://schemas.openxmlformats.org/markup-compatibility/2006" xmlns:a14="http://schemas.microsoft.com/office/drawing/2010/main">
+          <mc:Choice Requires="a14">
             <p:sp>
               <p:nvSpPr>
                 <p:cNvPr id="99" name="Rectangle 98"/>
@@ -34229,7 +34231,7 @@
               </p:txBody>
             </p:sp>
           </mc:Choice>
-          <mc:Fallback>
+          <mc:Fallback xmlns="">
             <p:sp>
               <p:nvSpPr>
                 <p:cNvPr id="99" name="Rectangle 98"/>
@@ -34268,8 +34270,8 @@
             </p:sp>
           </mc:Fallback>
         </mc:AlternateContent>
-        <mc:AlternateContent xmlns:mc="http://schemas.openxmlformats.org/markup-compatibility/2006">
-          <mc:Choice xmlns:a14="http://schemas.microsoft.com/office/drawing/2010/main" Requires="a14">
+        <mc:AlternateContent xmlns:mc="http://schemas.openxmlformats.org/markup-compatibility/2006" xmlns:a14="http://schemas.microsoft.com/office/drawing/2010/main">
+          <mc:Choice Requires="a14">
             <p:sp>
               <p:nvSpPr>
                 <p:cNvPr id="100" name="Rectangle 99"/>
@@ -34369,7 +34371,7 @@
               </p:txBody>
             </p:sp>
           </mc:Choice>
-          <mc:Fallback>
+          <mc:Fallback xmlns="">
             <p:sp>
               <p:nvSpPr>
                 <p:cNvPr id="100" name="Rectangle 99"/>
@@ -34522,8 +34524,8 @@
             </a:fontRef>
           </p:style>
         </p:cxnSp>
-        <mc:AlternateContent xmlns:mc="http://schemas.openxmlformats.org/markup-compatibility/2006">
-          <mc:Choice xmlns:a14="http://schemas.microsoft.com/office/drawing/2010/main" Requires="a14">
+        <mc:AlternateContent xmlns:mc="http://schemas.openxmlformats.org/markup-compatibility/2006" xmlns:a14="http://schemas.microsoft.com/office/drawing/2010/main">
+          <mc:Choice Requires="a14">
             <p:sp>
               <p:nvSpPr>
                 <p:cNvPr id="105" name="Rectangle 104"/>
@@ -34588,7 +34590,7 @@
               </p:txBody>
             </p:sp>
           </mc:Choice>
-          <mc:Fallback>
+          <mc:Fallback xmlns="">
             <p:sp>
               <p:nvSpPr>
                 <p:cNvPr id="105" name="Rectangle 104"/>
@@ -34627,8 +34629,8 @@
             </p:sp>
           </mc:Fallback>
         </mc:AlternateContent>
-        <mc:AlternateContent xmlns:mc="http://schemas.openxmlformats.org/markup-compatibility/2006">
-          <mc:Choice xmlns:a14="http://schemas.microsoft.com/office/drawing/2010/main" Requires="a14">
+        <mc:AlternateContent xmlns:mc="http://schemas.openxmlformats.org/markup-compatibility/2006" xmlns:a14="http://schemas.microsoft.com/office/drawing/2010/main">
+          <mc:Choice Requires="a14">
             <p:sp>
               <p:nvSpPr>
                 <p:cNvPr id="106" name="Rectangle 105"/>
@@ -34693,7 +34695,7 @@
               </p:txBody>
             </p:sp>
           </mc:Choice>
-          <mc:Fallback>
+          <mc:Fallback xmlns="">
             <p:sp>
               <p:nvSpPr>
                 <p:cNvPr id="106" name="Rectangle 105"/>
@@ -34732,8 +34734,8 @@
             </p:sp>
           </mc:Fallback>
         </mc:AlternateContent>
-        <mc:AlternateContent xmlns:mc="http://schemas.openxmlformats.org/markup-compatibility/2006">
-          <mc:Choice xmlns:a14="http://schemas.microsoft.com/office/drawing/2010/main" Requires="a14">
+        <mc:AlternateContent xmlns:mc="http://schemas.openxmlformats.org/markup-compatibility/2006" xmlns:a14="http://schemas.microsoft.com/office/drawing/2010/main">
+          <mc:Choice Requires="a14">
             <p:sp>
               <p:nvSpPr>
                 <p:cNvPr id="107" name="Rectangle 106"/>
@@ -34854,7 +34856,7 @@
               </p:txBody>
             </p:sp>
           </mc:Choice>
-          <mc:Fallback>
+          <mc:Fallback xmlns="">
             <p:sp>
               <p:nvSpPr>
                 <p:cNvPr id="107" name="Rectangle 106"/>
@@ -34893,8 +34895,8 @@
             </p:sp>
           </mc:Fallback>
         </mc:AlternateContent>
-        <mc:AlternateContent xmlns:mc="http://schemas.openxmlformats.org/markup-compatibility/2006">
-          <mc:Choice xmlns:a14="http://schemas.microsoft.com/office/drawing/2010/main" Requires="a14">
+        <mc:AlternateContent xmlns:mc="http://schemas.openxmlformats.org/markup-compatibility/2006" xmlns:a14="http://schemas.microsoft.com/office/drawing/2010/main">
+          <mc:Choice Requires="a14">
             <p:sp>
               <p:nvSpPr>
                 <p:cNvPr id="109" name="TextBox 108"/>
@@ -34941,18 +34943,11 @@
                     </a:rPr>
                     <a:t>’</a:t>
                   </a:r>
-                  <a:endParaRPr lang="en-US" sz="2000" dirty="0" smtClean="0">
-                    <a:solidFill>
-                      <a:srgbClr val="FF0000"/>
-                    </a:solidFill>
-                    <a:latin typeface="Arial" panose="020B0604020202020204" pitchFamily="34" charset="0"/>
-                    <a:cs typeface="Arial" panose="020B0604020202020204" pitchFamily="34" charset="0"/>
-                  </a:endParaRPr>
                 </a:p>
               </p:txBody>
             </p:sp>
           </mc:Choice>
-          <mc:Fallback>
+          <mc:Fallback xmlns="">
             <p:sp>
               <p:nvSpPr>
                 <p:cNvPr id="109" name="TextBox 108"/>
@@ -34991,8 +34986,8 @@
             </p:sp>
           </mc:Fallback>
         </mc:AlternateContent>
-        <mc:AlternateContent xmlns:mc="http://schemas.openxmlformats.org/markup-compatibility/2006">
-          <mc:Choice xmlns:a14="http://schemas.microsoft.com/office/drawing/2010/main" Requires="a14">
+        <mc:AlternateContent xmlns:mc="http://schemas.openxmlformats.org/markup-compatibility/2006" xmlns:a14="http://schemas.microsoft.com/office/drawing/2010/main">
+          <mc:Choice Requires="a14">
             <p:sp>
               <p:nvSpPr>
                 <p:cNvPr id="110" name="TextBox 109"/>
@@ -35015,6 +35010,7 @@
                 </a:bodyPr>
                 <a:lstStyle/>
                 <a:p>
+                  <a:pPr/>
                   <a14:m>
                     <m:oMathPara xmlns:m="http://schemas.openxmlformats.org/officeDocument/2006/math">
                       <m:oMathParaPr>
@@ -35039,7 +35035,7 @@
               </p:txBody>
             </p:sp>
           </mc:Choice>
-          <mc:Fallback>
+          <mc:Fallback xmlns="">
             <p:sp>
               <p:nvSpPr>
                 <p:cNvPr id="110" name="TextBox 109"/>
@@ -35109,6 +35105,2494 @@
           <a:chExt cx="0" cy="0"/>
         </a:xfrm>
       </p:grpSpPr>
+      <p:grpSp>
+        <p:nvGrpSpPr>
+          <p:cNvPr id="25" name="Group 24"/>
+          <p:cNvGrpSpPr/>
+          <p:nvPr/>
+        </p:nvGrpSpPr>
+        <p:grpSpPr>
+          <a:xfrm>
+            <a:off x="136393" y="69325"/>
+            <a:ext cx="5937984" cy="3085168"/>
+            <a:chOff x="136393" y="69325"/>
+            <a:chExt cx="5937984" cy="3085168"/>
+          </a:xfrm>
+        </p:grpSpPr>
+        <p:sp>
+          <p:nvSpPr>
+            <p:cNvPr id="2" name="Rectangle 1"/>
+            <p:cNvSpPr/>
+            <p:nvPr/>
+          </p:nvSpPr>
+          <p:spPr>
+            <a:xfrm>
+              <a:off x="205840" y="513580"/>
+              <a:ext cx="4953000" cy="1122291"/>
+            </a:xfrm>
+            <a:prstGeom prst="rect">
+              <a:avLst/>
+            </a:prstGeom>
+            <a:ln w="38100">
+              <a:solidFill>
+                <a:schemeClr val="tx1"/>
+              </a:solidFill>
+            </a:ln>
+          </p:spPr>
+          <p:txBody>
+            <a:bodyPr rot="0" spcFirstLastPara="0" vertOverflow="overflow" horzOverflow="overflow" vert="horz" wrap="square" lIns="91440" tIns="45720" rIns="91440" bIns="45720" numCol="1" spcCol="0" rtlCol="0" fromWordArt="0" anchor="ctr" anchorCtr="0" forceAA="0" compatLnSpc="1">
+              <a:prstTxWarp prst="textNoShape">
+                <a:avLst/>
+              </a:prstTxWarp>
+              <a:spAutoFit/>
+            </a:bodyPr>
+            <a:lstStyle/>
+            <a:p>
+              <a:pPr marL="234950" indent="-234950" algn="ctr" fontAlgn="t">
+                <a:buFont typeface="Arial" panose="020B0604020202020204" pitchFamily="34" charset="0"/>
+                <a:buChar char="•"/>
+              </a:pPr>
+              <a:endParaRPr lang="en-US">
+                <a:solidFill>
+                  <a:srgbClr val="353535"/>
+                </a:solidFill>
+                <a:latin typeface="arial" panose="020B0604020202020204" pitchFamily="34" charset="0"/>
+              </a:endParaRPr>
+            </a:p>
+          </p:txBody>
+        </p:sp>
+        <p:sp>
+          <p:nvSpPr>
+            <p:cNvPr id="3" name="TextBox 2"/>
+            <p:cNvSpPr txBox="1"/>
+            <p:nvPr/>
+          </p:nvSpPr>
+          <p:spPr>
+            <a:xfrm>
+              <a:off x="136393" y="513580"/>
+              <a:ext cx="4908716" cy="707886"/>
+            </a:xfrm>
+            <a:prstGeom prst="rect">
+              <a:avLst/>
+            </a:prstGeom>
+            <a:noFill/>
+          </p:spPr>
+          <p:txBody>
+            <a:bodyPr wrap="none" rtlCol="0">
+              <a:spAutoFit/>
+            </a:bodyPr>
+            <a:lstStyle/>
+            <a:p>
+              <a:r>
+                <a:rPr lang="en-US" sz="4000" dirty="0" smtClean="0">
+                  <a:solidFill>
+                    <a:schemeClr val="accent1"/>
+                  </a:solidFill>
+                  <a:latin typeface="Arial" panose="020B0604020202020204" pitchFamily="34" charset="0"/>
+                  <a:cs typeface="Arial" panose="020B0604020202020204" pitchFamily="34" charset="0"/>
+                </a:rPr>
+                <a:t>+ + + + + + + + + + +</a:t>
+              </a:r>
+            </a:p>
+          </p:txBody>
+        </p:sp>
+        <p:sp>
+          <p:nvSpPr>
+            <p:cNvPr id="4" name="TextBox 3"/>
+            <p:cNvSpPr txBox="1"/>
+            <p:nvPr/>
+          </p:nvSpPr>
+          <p:spPr>
+            <a:xfrm>
+              <a:off x="205840" y="927985"/>
+              <a:ext cx="4924746" cy="707886"/>
+            </a:xfrm>
+            <a:prstGeom prst="rect">
+              <a:avLst/>
+            </a:prstGeom>
+            <a:noFill/>
+          </p:spPr>
+          <p:txBody>
+            <a:bodyPr wrap="none" rtlCol="0">
+              <a:spAutoFit/>
+            </a:bodyPr>
+            <a:lstStyle/>
+            <a:p>
+              <a:r>
+                <a:rPr lang="en-US" sz="4000" dirty="0" smtClean="0">
+                  <a:solidFill>
+                    <a:srgbClr val="FF0000"/>
+                  </a:solidFill>
+                  <a:latin typeface="Arial" panose="020B0604020202020204" pitchFamily="34" charset="0"/>
+                  <a:cs typeface="Arial" panose="020B0604020202020204" pitchFamily="34" charset="0"/>
+                </a:rPr>
+                <a:t>-  -  -  -  -  -  -  -  -  -  -</a:t>
+              </a:r>
+            </a:p>
+          </p:txBody>
+        </p:sp>
+        <p:cxnSp>
+          <p:nvCxnSpPr>
+            <p:cNvPr id="5" name="Straight Arrow Connector 4"/>
+            <p:cNvCxnSpPr/>
+            <p:nvPr/>
+          </p:nvCxnSpPr>
+          <p:spPr>
+            <a:xfrm>
+              <a:off x="5282807" y="1322067"/>
+              <a:ext cx="791570" cy="0"/>
+            </a:xfrm>
+            <a:prstGeom prst="straightConnector1">
+              <a:avLst/>
+            </a:prstGeom>
+            <a:ln w="60325">
+              <a:solidFill>
+                <a:srgbClr val="FF0000"/>
+              </a:solidFill>
+              <a:tailEnd type="triangle"/>
+            </a:ln>
+          </p:spPr>
+          <p:style>
+            <a:lnRef idx="1">
+              <a:schemeClr val="accent1"/>
+            </a:lnRef>
+            <a:fillRef idx="0">
+              <a:schemeClr val="accent1"/>
+            </a:fillRef>
+            <a:effectRef idx="0">
+              <a:schemeClr val="accent1"/>
+            </a:effectRef>
+            <a:fontRef idx="minor">
+              <a:schemeClr val="tx1"/>
+            </a:fontRef>
+          </p:style>
+        </p:cxnSp>
+        <mc:AlternateContent xmlns:mc="http://schemas.openxmlformats.org/markup-compatibility/2006">
+          <mc:Choice xmlns:a14="http://schemas.microsoft.com/office/drawing/2010/main" Requires="a14">
+            <p:sp>
+              <p:nvSpPr>
+                <p:cNvPr id="6" name="TextBox 5"/>
+                <p:cNvSpPr txBox="1"/>
+                <p:nvPr/>
+              </p:nvSpPr>
+              <p:spPr>
+                <a:xfrm>
+                  <a:off x="5334237" y="645598"/>
+                  <a:ext cx="549958" cy="492443"/>
+                </a:xfrm>
+                <a:prstGeom prst="rect">
+                  <a:avLst/>
+                </a:prstGeom>
+                <a:noFill/>
+              </p:spPr>
+              <p:txBody>
+                <a:bodyPr wrap="none" lIns="0" tIns="0" rIns="0" bIns="0" rtlCol="0">
+                  <a:spAutoFit/>
+                </a:bodyPr>
+                <a:lstStyle/>
+                <a:p>
+                  <a:pPr/>
+                  <a14:m>
+                    <m:oMathPara xmlns:m="http://schemas.openxmlformats.org/officeDocument/2006/math">
+                      <m:oMathParaPr>
+                        <m:jc m:val="centerGroup"/>
+                      </m:oMathParaPr>
+                      <m:oMath xmlns:m="http://schemas.openxmlformats.org/officeDocument/2006/math">
+                        <m:sSub>
+                          <m:sSubPr>
+                            <m:ctrlPr>
+                              <a:rPr lang="en-US" sz="3200" b="0" i="1" smtClean="0">
+                                <a:solidFill>
+                                  <a:srgbClr val="FF0000"/>
+                                </a:solidFill>
+                                <a:latin typeface="Cambria Math" panose="02040503050406030204" pitchFamily="18" charset="0"/>
+                                <a:cs typeface="Arial" panose="020B0604020202020204" pitchFamily="34" charset="0"/>
+                              </a:rPr>
+                            </m:ctrlPr>
+                          </m:sSubPr>
+                          <m:e>
+                            <m:acc>
+                              <m:accPr>
+                                <m:chr m:val="⃗"/>
+                                <m:ctrlPr>
+                                  <a:rPr lang="en-US" sz="3200" b="0" i="1" smtClean="0">
+                                    <a:solidFill>
+                                      <a:srgbClr val="FF0000"/>
+                                    </a:solidFill>
+                                    <a:latin typeface="Cambria Math" panose="02040503050406030204" pitchFamily="18" charset="0"/>
+                                    <a:cs typeface="Arial" panose="020B0604020202020204" pitchFamily="34" charset="0"/>
+                                  </a:rPr>
+                                </m:ctrlPr>
+                              </m:accPr>
+                              <m:e>
+                                <m:r>
+                                  <a:rPr lang="en-US" sz="3200" b="0" i="1" smtClean="0">
+                                    <a:solidFill>
+                                      <a:srgbClr val="FF0000"/>
+                                    </a:solidFill>
+                                    <a:latin typeface="Cambria Math" panose="02040503050406030204" pitchFamily="18" charset="0"/>
+                                    <a:cs typeface="Arial" panose="020B0604020202020204" pitchFamily="34" charset="0"/>
+                                  </a:rPr>
+                                  <m:t>𝑣</m:t>
+                                </m:r>
+                              </m:e>
+                            </m:acc>
+                          </m:e>
+                          <m:sub>
+                            <m:r>
+                              <a:rPr lang="en-US" sz="3200" b="0" i="1" smtClean="0">
+                                <a:solidFill>
+                                  <a:srgbClr val="FF0000"/>
+                                </a:solidFill>
+                                <a:latin typeface="Cambria Math" panose="02040503050406030204" pitchFamily="18" charset="0"/>
+                                <a:cs typeface="Arial" panose="020B0604020202020204" pitchFamily="34" charset="0"/>
+                              </a:rPr>
+                              <m:t>𝑑</m:t>
+                            </m:r>
+                          </m:sub>
+                        </m:sSub>
+                      </m:oMath>
+                    </m:oMathPara>
+                  </a14:m>
+                  <a:endParaRPr lang="en-US" sz="3200" dirty="0" smtClean="0">
+                    <a:solidFill>
+                      <a:srgbClr val="FF0000"/>
+                    </a:solidFill>
+                    <a:latin typeface="Arial" panose="020B0604020202020204" pitchFamily="34" charset="0"/>
+                    <a:cs typeface="Arial" panose="020B0604020202020204" pitchFamily="34" charset="0"/>
+                  </a:endParaRPr>
+                </a:p>
+              </p:txBody>
+            </p:sp>
+          </mc:Choice>
+          <mc:Fallback>
+            <p:sp>
+              <p:nvSpPr>
+                <p:cNvPr id="6" name="TextBox 5"/>
+                <p:cNvSpPr txBox="1">
+                  <a:spLocks noRot="1" noChangeAspect="1" noMove="1" noResize="1" noEditPoints="1" noAdjustHandles="1" noChangeArrowheads="1" noChangeShapeType="1" noTextEdit="1"/>
+                </p:cNvSpPr>
+                <p:nvPr/>
+              </p:nvSpPr>
+              <p:spPr>
+                <a:xfrm>
+                  <a:off x="5334237" y="645598"/>
+                  <a:ext cx="549958" cy="492443"/>
+                </a:xfrm>
+                <a:prstGeom prst="rect">
+                  <a:avLst/>
+                </a:prstGeom>
+                <a:blipFill>
+                  <a:blip r:embed="rId2"/>
+                  <a:stretch>
+                    <a:fillRect/>
+                  </a:stretch>
+                </a:blipFill>
+              </p:spPr>
+              <p:txBody>
+                <a:bodyPr/>
+                <a:lstStyle/>
+                <a:p>
+                  <a:r>
+                    <a:rPr lang="en-US">
+                      <a:noFill/>
+                    </a:rPr>
+                    <a:t> </a:t>
+                  </a:r>
+                </a:p>
+              </p:txBody>
+            </p:sp>
+          </mc:Fallback>
+        </mc:AlternateContent>
+        <p:sp>
+          <p:nvSpPr>
+            <p:cNvPr id="7" name="Oval 6"/>
+            <p:cNvSpPr/>
+            <p:nvPr/>
+          </p:nvSpPr>
+          <p:spPr>
+            <a:xfrm>
+              <a:off x="2590751" y="2154580"/>
+              <a:ext cx="275265" cy="259307"/>
+            </a:xfrm>
+            <a:prstGeom prst="ellipse">
+              <a:avLst/>
+            </a:prstGeom>
+            <a:solidFill>
+              <a:schemeClr val="accent1"/>
+            </a:solidFill>
+            <a:ln w="38100">
+              <a:solidFill>
+                <a:schemeClr val="accent1"/>
+              </a:solidFill>
+            </a:ln>
+          </p:spPr>
+          <p:txBody>
+            <a:bodyPr rot="0" spcFirstLastPara="0" vertOverflow="overflow" horzOverflow="overflow" vert="horz" wrap="square" lIns="91440" tIns="45720" rIns="91440" bIns="45720" numCol="1" spcCol="0" rtlCol="0" fromWordArt="0" anchor="ctr" anchorCtr="0" forceAA="0" compatLnSpc="1">
+              <a:prstTxWarp prst="textNoShape">
+                <a:avLst/>
+              </a:prstTxWarp>
+              <a:spAutoFit/>
+            </a:bodyPr>
+            <a:lstStyle/>
+            <a:p>
+              <a:pPr marL="234950" indent="-234950" algn="ctr" fontAlgn="t">
+                <a:buFont typeface="Arial" panose="020B0604020202020204" pitchFamily="34" charset="0"/>
+                <a:buChar char="•"/>
+              </a:pPr>
+              <a:endParaRPr lang="en-US" dirty="0">
+                <a:solidFill>
+                  <a:srgbClr val="353535"/>
+                </a:solidFill>
+                <a:latin typeface="arial" panose="020B0604020202020204" pitchFamily="34" charset="0"/>
+              </a:endParaRPr>
+            </a:p>
+          </p:txBody>
+        </p:sp>
+        <mc:AlternateContent xmlns:mc="http://schemas.openxmlformats.org/markup-compatibility/2006">
+          <mc:Choice xmlns:a14="http://schemas.microsoft.com/office/drawing/2010/main" Requires="a14">
+            <p:sp>
+              <p:nvSpPr>
+                <p:cNvPr id="8" name="TextBox 7"/>
+                <p:cNvSpPr txBox="1"/>
+                <p:nvPr/>
+              </p:nvSpPr>
+              <p:spPr>
+                <a:xfrm>
+                  <a:off x="2556187" y="2430806"/>
+                  <a:ext cx="619657" cy="430887"/>
+                </a:xfrm>
+                <a:prstGeom prst="rect">
+                  <a:avLst/>
+                </a:prstGeom>
+                <a:noFill/>
+              </p:spPr>
+              <p:txBody>
+                <a:bodyPr wrap="none" lIns="0" tIns="0" rIns="0" bIns="0" rtlCol="0">
+                  <a:spAutoFit/>
+                </a:bodyPr>
+                <a:lstStyle/>
+                <a:p>
+                  <a:pPr/>
+                  <a14:m>
+                    <m:oMathPara xmlns:m="http://schemas.openxmlformats.org/officeDocument/2006/math">
+                      <m:oMathParaPr>
+                        <m:jc m:val="centerGroup"/>
+                      </m:oMathParaPr>
+                      <m:oMath xmlns:m="http://schemas.openxmlformats.org/officeDocument/2006/math">
+                        <m:r>
+                          <a:rPr lang="en-US" sz="2800" b="0" i="1" smtClean="0">
+                            <a:solidFill>
+                              <a:schemeClr val="accent1"/>
+                            </a:solidFill>
+                            <a:latin typeface="Cambria Math" panose="02040503050406030204" pitchFamily="18" charset="0"/>
+                            <a:cs typeface="Arial" panose="020B0604020202020204" pitchFamily="34" charset="0"/>
+                          </a:rPr>
+                          <m:t>+</m:t>
+                        </m:r>
+                        <m:r>
+                          <a:rPr lang="en-US" sz="2800" b="0" i="1" smtClean="0">
+                            <a:solidFill>
+                              <a:schemeClr val="accent1"/>
+                            </a:solidFill>
+                            <a:latin typeface="Cambria Math" panose="02040503050406030204" pitchFamily="18" charset="0"/>
+                            <a:cs typeface="Arial" panose="020B0604020202020204" pitchFamily="34" charset="0"/>
+                          </a:rPr>
+                          <m:t>𝑄</m:t>
+                        </m:r>
+                      </m:oMath>
+                    </m:oMathPara>
+                  </a14:m>
+                  <a:endParaRPr lang="en-US" sz="2800" dirty="0" smtClean="0">
+                    <a:solidFill>
+                      <a:schemeClr val="accent1"/>
+                    </a:solidFill>
+                    <a:latin typeface="Arial" panose="020B0604020202020204" pitchFamily="34" charset="0"/>
+                    <a:cs typeface="Arial" panose="020B0604020202020204" pitchFamily="34" charset="0"/>
+                  </a:endParaRPr>
+                </a:p>
+              </p:txBody>
+            </p:sp>
+          </mc:Choice>
+          <mc:Fallback>
+            <p:sp>
+              <p:nvSpPr>
+                <p:cNvPr id="8" name="TextBox 7"/>
+                <p:cNvSpPr txBox="1">
+                  <a:spLocks noRot="1" noChangeAspect="1" noMove="1" noResize="1" noEditPoints="1" noAdjustHandles="1" noChangeArrowheads="1" noChangeShapeType="1" noTextEdit="1"/>
+                </p:cNvSpPr>
+                <p:nvPr/>
+              </p:nvSpPr>
+              <p:spPr>
+                <a:xfrm>
+                  <a:off x="2556187" y="2430806"/>
+                  <a:ext cx="619657" cy="430887"/>
+                </a:xfrm>
+                <a:prstGeom prst="rect">
+                  <a:avLst/>
+                </a:prstGeom>
+                <a:blipFill>
+                  <a:blip r:embed="rId3"/>
+                  <a:stretch>
+                    <a:fillRect/>
+                  </a:stretch>
+                </a:blipFill>
+              </p:spPr>
+              <p:txBody>
+                <a:bodyPr/>
+                <a:lstStyle/>
+                <a:p>
+                  <a:r>
+                    <a:rPr lang="en-US">
+                      <a:noFill/>
+                    </a:rPr>
+                    <a:t> </a:t>
+                  </a:r>
+                </a:p>
+              </p:txBody>
+            </p:sp>
+          </mc:Fallback>
+        </mc:AlternateContent>
+        <p:sp>
+          <p:nvSpPr>
+            <p:cNvPr id="9" name="Oval 8"/>
+            <p:cNvSpPr/>
+            <p:nvPr/>
+          </p:nvSpPr>
+          <p:spPr>
+            <a:xfrm>
+              <a:off x="1379547" y="2154580"/>
+              <a:ext cx="395785" cy="382137"/>
+            </a:xfrm>
+            <a:prstGeom prst="ellipse">
+              <a:avLst/>
+            </a:prstGeom>
+            <a:ln w="38100">
+              <a:solidFill>
+                <a:schemeClr val="tx1"/>
+              </a:solidFill>
+            </a:ln>
+          </p:spPr>
+          <p:txBody>
+            <a:bodyPr rot="0" spcFirstLastPara="0" vertOverflow="overflow" horzOverflow="overflow" vert="horz" wrap="square" lIns="91440" tIns="45720" rIns="91440" bIns="45720" numCol="1" spcCol="0" rtlCol="0" fromWordArt="0" anchor="ctr" anchorCtr="0" forceAA="0" compatLnSpc="1">
+              <a:prstTxWarp prst="textNoShape">
+                <a:avLst/>
+              </a:prstTxWarp>
+              <a:spAutoFit/>
+            </a:bodyPr>
+            <a:lstStyle/>
+            <a:p>
+              <a:pPr marL="234950" indent="-234950" algn="ctr" fontAlgn="t">
+                <a:buFont typeface="Arial" panose="020B0604020202020204" pitchFamily="34" charset="0"/>
+                <a:buChar char="•"/>
+              </a:pPr>
+              <a:endParaRPr lang="en-US">
+                <a:solidFill>
+                  <a:srgbClr val="353535"/>
+                </a:solidFill>
+                <a:latin typeface="arial" panose="020B0604020202020204" pitchFamily="34" charset="0"/>
+              </a:endParaRPr>
+            </a:p>
+          </p:txBody>
+        </p:sp>
+        <p:sp>
+          <p:nvSpPr>
+            <p:cNvPr id="10" name="Oval 9"/>
+            <p:cNvSpPr/>
+            <p:nvPr/>
+          </p:nvSpPr>
+          <p:spPr>
+            <a:xfrm>
+              <a:off x="1536496" y="2291057"/>
+              <a:ext cx="81886" cy="109182"/>
+            </a:xfrm>
+            <a:prstGeom prst="ellipse">
+              <a:avLst/>
+            </a:prstGeom>
+            <a:solidFill>
+              <a:schemeClr val="tx1"/>
+            </a:solidFill>
+            <a:ln w="38100">
+              <a:solidFill>
+                <a:schemeClr val="tx1"/>
+              </a:solidFill>
+            </a:ln>
+          </p:spPr>
+          <p:txBody>
+            <a:bodyPr rot="0" spcFirstLastPara="0" vertOverflow="overflow" horzOverflow="overflow" vert="horz" wrap="square" lIns="91440" tIns="45720" rIns="91440" bIns="45720" numCol="1" spcCol="0" rtlCol="0" fromWordArt="0" anchor="ctr" anchorCtr="0" forceAA="0" compatLnSpc="1">
+              <a:prstTxWarp prst="textNoShape">
+                <a:avLst/>
+              </a:prstTxWarp>
+              <a:spAutoFit/>
+            </a:bodyPr>
+            <a:lstStyle/>
+            <a:p>
+              <a:pPr marL="234950" indent="-234950" algn="ctr" fontAlgn="t">
+                <a:buFont typeface="Arial" panose="020B0604020202020204" pitchFamily="34" charset="0"/>
+                <a:buChar char="•"/>
+              </a:pPr>
+              <a:endParaRPr lang="en-US">
+                <a:solidFill>
+                  <a:srgbClr val="353535"/>
+                </a:solidFill>
+                <a:latin typeface="arial" panose="020B0604020202020204" pitchFamily="34" charset="0"/>
+              </a:endParaRPr>
+            </a:p>
+          </p:txBody>
+        </p:sp>
+        <mc:AlternateContent xmlns:mc="http://schemas.openxmlformats.org/markup-compatibility/2006">
+          <mc:Choice xmlns:a14="http://schemas.microsoft.com/office/drawing/2010/main" Requires="a14">
+            <p:sp>
+              <p:nvSpPr>
+                <p:cNvPr id="11" name="TextBox 10"/>
+                <p:cNvSpPr txBox="1"/>
+                <p:nvPr/>
+              </p:nvSpPr>
+              <p:spPr>
+                <a:xfrm>
+                  <a:off x="1379547" y="2602162"/>
+                  <a:ext cx="394147" cy="552331"/>
+                </a:xfrm>
+                <a:prstGeom prst="rect">
+                  <a:avLst/>
+                </a:prstGeom>
+                <a:noFill/>
+              </p:spPr>
+              <p:txBody>
+                <a:bodyPr wrap="none" lIns="0" tIns="0" rIns="0" bIns="0" rtlCol="0">
+                  <a:spAutoFit/>
+                </a:bodyPr>
+                <a:lstStyle/>
+                <a:p>
+                  <a:pPr/>
+                  <a14:m>
+                    <m:oMathPara xmlns:m="http://schemas.openxmlformats.org/officeDocument/2006/math">
+                      <m:oMathParaPr>
+                        <m:jc m:val="centerGroup"/>
+                      </m:oMathParaPr>
+                      <m:oMath xmlns:m="http://schemas.openxmlformats.org/officeDocument/2006/math">
+                        <m:acc>
+                          <m:accPr>
+                            <m:chr m:val="⃗"/>
+                            <m:ctrlPr>
+                              <a:rPr lang="en-US" sz="3200" b="0" i="1" smtClean="0">
+                                <a:latin typeface="Cambria Math" panose="02040503050406030204" pitchFamily="18" charset="0"/>
+                                <a:cs typeface="Arial" panose="020B0604020202020204" pitchFamily="34" charset="0"/>
+                              </a:rPr>
+                            </m:ctrlPr>
+                          </m:accPr>
+                          <m:e>
+                            <m:r>
+                              <a:rPr lang="en-US" sz="3200" b="0" i="1" smtClean="0">
+                                <a:latin typeface="Cambria Math" panose="02040503050406030204" pitchFamily="18" charset="0"/>
+                                <a:cs typeface="Arial" panose="020B0604020202020204" pitchFamily="34" charset="0"/>
+                              </a:rPr>
+                              <m:t>𝐵</m:t>
+                            </m:r>
+                          </m:e>
+                        </m:acc>
+                      </m:oMath>
+                    </m:oMathPara>
+                  </a14:m>
+                  <a:endParaRPr lang="en-US" sz="3200" dirty="0" smtClean="0">
+                    <a:latin typeface="Arial" panose="020B0604020202020204" pitchFamily="34" charset="0"/>
+                    <a:cs typeface="Arial" panose="020B0604020202020204" pitchFamily="34" charset="0"/>
+                  </a:endParaRPr>
+                </a:p>
+              </p:txBody>
+            </p:sp>
+          </mc:Choice>
+          <mc:Fallback>
+            <p:sp>
+              <p:nvSpPr>
+                <p:cNvPr id="11" name="TextBox 10"/>
+                <p:cNvSpPr txBox="1">
+                  <a:spLocks noRot="1" noChangeAspect="1" noMove="1" noResize="1" noEditPoints="1" noAdjustHandles="1" noChangeArrowheads="1" noChangeShapeType="1" noTextEdit="1"/>
+                </p:cNvSpPr>
+                <p:nvPr/>
+              </p:nvSpPr>
+              <p:spPr>
+                <a:xfrm>
+                  <a:off x="1379547" y="2602162"/>
+                  <a:ext cx="394147" cy="552331"/>
+                </a:xfrm>
+                <a:prstGeom prst="rect">
+                  <a:avLst/>
+                </a:prstGeom>
+                <a:blipFill>
+                  <a:blip r:embed="rId4"/>
+                  <a:stretch>
+                    <a:fillRect/>
+                  </a:stretch>
+                </a:blipFill>
+              </p:spPr>
+              <p:txBody>
+                <a:bodyPr/>
+                <a:lstStyle/>
+                <a:p>
+                  <a:r>
+                    <a:rPr lang="en-US">
+                      <a:noFill/>
+                    </a:rPr>
+                    <a:t> </a:t>
+                  </a:r>
+                </a:p>
+              </p:txBody>
+            </p:sp>
+          </mc:Fallback>
+        </mc:AlternateContent>
+        <p:cxnSp>
+          <p:nvCxnSpPr>
+            <p:cNvPr id="20" name="Straight Arrow Connector 19"/>
+            <p:cNvCxnSpPr/>
+            <p:nvPr/>
+          </p:nvCxnSpPr>
+          <p:spPr>
+            <a:xfrm flipH="1">
+              <a:off x="1618382" y="377102"/>
+              <a:ext cx="1080573" cy="0"/>
+            </a:xfrm>
+            <a:prstGeom prst="straightConnector1">
+              <a:avLst/>
+            </a:prstGeom>
+            <a:ln w="38100">
+              <a:solidFill>
+                <a:schemeClr val="tx1"/>
+              </a:solidFill>
+              <a:tailEnd type="triangle"/>
+            </a:ln>
+          </p:spPr>
+          <p:style>
+            <a:lnRef idx="1">
+              <a:schemeClr val="accent1"/>
+            </a:lnRef>
+            <a:fillRef idx="0">
+              <a:schemeClr val="accent1"/>
+            </a:fillRef>
+            <a:effectRef idx="0">
+              <a:schemeClr val="accent1"/>
+            </a:effectRef>
+            <a:fontRef idx="minor">
+              <a:schemeClr val="tx1"/>
+            </a:fontRef>
+          </p:style>
+        </p:cxnSp>
+        <mc:AlternateContent xmlns:mc="http://schemas.openxmlformats.org/markup-compatibility/2006">
+          <mc:Choice xmlns:a14="http://schemas.microsoft.com/office/drawing/2010/main" Requires="a14">
+            <p:sp>
+              <p:nvSpPr>
+                <p:cNvPr id="24" name="TextBox 23"/>
+                <p:cNvSpPr txBox="1"/>
+                <p:nvPr/>
+              </p:nvSpPr>
+              <p:spPr>
+                <a:xfrm>
+                  <a:off x="2286001" y="69325"/>
+                  <a:ext cx="176459" cy="307777"/>
+                </a:xfrm>
+                <a:prstGeom prst="rect">
+                  <a:avLst/>
+                </a:prstGeom>
+                <a:noFill/>
+              </p:spPr>
+              <p:txBody>
+                <a:bodyPr wrap="none" lIns="0" tIns="0" rIns="0" bIns="0" rtlCol="0">
+                  <a:spAutoFit/>
+                </a:bodyPr>
+                <a:lstStyle/>
+                <a:p>
+                  <a14:m>
+                    <m:oMathPara xmlns:m="http://schemas.openxmlformats.org/officeDocument/2006/math">
+                      <m:oMathParaPr>
+                        <m:jc m:val="centerGroup"/>
+                      </m:oMathParaPr>
+                      <m:oMath xmlns:m="http://schemas.openxmlformats.org/officeDocument/2006/math">
+                        <m:r>
+                          <a:rPr lang="en-US" sz="2000" b="0" i="1" smtClean="0">
+                            <a:latin typeface="Cambria Math" panose="02040503050406030204" pitchFamily="18" charset="0"/>
+                            <a:cs typeface="Arial" panose="020B0604020202020204" pitchFamily="34" charset="0"/>
+                          </a:rPr>
+                          <m:t>𝐼</m:t>
+                        </m:r>
+                      </m:oMath>
+                    </m:oMathPara>
+                  </a14:m>
+                  <a:endParaRPr lang="en-US" sz="2000" dirty="0" smtClean="0">
+                    <a:latin typeface="Arial" panose="020B0604020202020204" pitchFamily="34" charset="0"/>
+                    <a:cs typeface="Arial" panose="020B0604020202020204" pitchFamily="34" charset="0"/>
+                  </a:endParaRPr>
+                </a:p>
+              </p:txBody>
+            </p:sp>
+          </mc:Choice>
+          <mc:Fallback>
+            <p:sp>
+              <p:nvSpPr>
+                <p:cNvPr id="24" name="TextBox 23"/>
+                <p:cNvSpPr txBox="1">
+                  <a:spLocks noRot="1" noChangeAspect="1" noMove="1" noResize="1" noEditPoints="1" noAdjustHandles="1" noChangeArrowheads="1" noChangeShapeType="1" noTextEdit="1"/>
+                </p:cNvSpPr>
+                <p:nvPr/>
+              </p:nvSpPr>
+              <p:spPr>
+                <a:xfrm>
+                  <a:off x="2286001" y="69325"/>
+                  <a:ext cx="176459" cy="307777"/>
+                </a:xfrm>
+                <a:prstGeom prst="rect">
+                  <a:avLst/>
+                </a:prstGeom>
+                <a:blipFill>
+                  <a:blip r:embed="rId5"/>
+                  <a:stretch>
+                    <a:fillRect l="-27586" r="-24138" b="-9804"/>
+                  </a:stretch>
+                </a:blipFill>
+              </p:spPr>
+              <p:txBody>
+                <a:bodyPr/>
+                <a:lstStyle/>
+                <a:p>
+                  <a:r>
+                    <a:rPr lang="en-US">
+                      <a:noFill/>
+                    </a:rPr>
+                    <a:t> </a:t>
+                  </a:r>
+                </a:p>
+              </p:txBody>
+            </p:sp>
+          </mc:Fallback>
+        </mc:AlternateContent>
+      </p:grpSp>
+      <p:grpSp>
+        <p:nvGrpSpPr>
+          <p:cNvPr id="44" name="Group 43"/>
+          <p:cNvGrpSpPr/>
+          <p:nvPr/>
+        </p:nvGrpSpPr>
+        <p:grpSpPr>
+          <a:xfrm>
+            <a:off x="494840" y="3656628"/>
+            <a:ext cx="5937984" cy="3085168"/>
+            <a:chOff x="494840" y="3656628"/>
+            <a:chExt cx="5937984" cy="3085168"/>
+          </a:xfrm>
+        </p:grpSpPr>
+        <p:grpSp>
+          <p:nvGrpSpPr>
+            <p:cNvPr id="26" name="Group 25"/>
+            <p:cNvGrpSpPr/>
+            <p:nvPr/>
+          </p:nvGrpSpPr>
+          <p:grpSpPr>
+            <a:xfrm>
+              <a:off x="494840" y="3656628"/>
+              <a:ext cx="5937984" cy="3085168"/>
+              <a:chOff x="136393" y="69325"/>
+              <a:chExt cx="5937984" cy="3085168"/>
+            </a:xfrm>
+          </p:grpSpPr>
+          <p:sp>
+            <p:nvSpPr>
+              <p:cNvPr id="27" name="Rectangle 26"/>
+              <p:cNvSpPr/>
+              <p:nvPr/>
+            </p:nvSpPr>
+            <p:spPr>
+              <a:xfrm>
+                <a:off x="205840" y="513580"/>
+                <a:ext cx="4953000" cy="1122291"/>
+              </a:xfrm>
+              <a:prstGeom prst="rect">
+                <a:avLst/>
+              </a:prstGeom>
+              <a:ln w="38100">
+                <a:solidFill>
+                  <a:schemeClr val="tx1"/>
+                </a:solidFill>
+              </a:ln>
+            </p:spPr>
+            <p:txBody>
+              <a:bodyPr rot="0" spcFirstLastPara="0" vertOverflow="overflow" horzOverflow="overflow" vert="horz" wrap="square" lIns="91440" tIns="45720" rIns="91440" bIns="45720" numCol="1" spcCol="0" rtlCol="0" fromWordArt="0" anchor="ctr" anchorCtr="0" forceAA="0" compatLnSpc="1">
+                <a:prstTxWarp prst="textNoShape">
+                  <a:avLst/>
+                </a:prstTxWarp>
+                <a:spAutoFit/>
+              </a:bodyPr>
+              <a:lstStyle/>
+              <a:p>
+                <a:pPr marL="234950" indent="-234950" algn="ctr" fontAlgn="t">
+                  <a:buFont typeface="Arial" panose="020B0604020202020204" pitchFamily="34" charset="0"/>
+                  <a:buChar char="•"/>
+                </a:pPr>
+                <a:endParaRPr lang="en-US">
+                  <a:solidFill>
+                    <a:srgbClr val="353535"/>
+                  </a:solidFill>
+                  <a:latin typeface="arial" panose="020B0604020202020204" pitchFamily="34" charset="0"/>
+                </a:endParaRPr>
+              </a:p>
+            </p:txBody>
+          </p:sp>
+          <p:sp>
+            <p:nvSpPr>
+              <p:cNvPr id="28" name="TextBox 27"/>
+              <p:cNvSpPr txBox="1"/>
+              <p:nvPr/>
+            </p:nvSpPr>
+            <p:spPr>
+              <a:xfrm>
+                <a:off x="136393" y="513580"/>
+                <a:ext cx="4908716" cy="707886"/>
+              </a:xfrm>
+              <a:prstGeom prst="rect">
+                <a:avLst/>
+              </a:prstGeom>
+              <a:noFill/>
+            </p:spPr>
+            <p:txBody>
+              <a:bodyPr wrap="none" rtlCol="0">
+                <a:spAutoFit/>
+              </a:bodyPr>
+              <a:lstStyle/>
+              <a:p>
+                <a:r>
+                  <a:rPr lang="en-US" sz="4000" dirty="0" smtClean="0">
+                    <a:solidFill>
+                      <a:schemeClr val="accent1"/>
+                    </a:solidFill>
+                    <a:latin typeface="Arial" panose="020B0604020202020204" pitchFamily="34" charset="0"/>
+                    <a:cs typeface="Arial" panose="020B0604020202020204" pitchFamily="34" charset="0"/>
+                  </a:rPr>
+                  <a:t>+ + + + + + + + + + +</a:t>
+                </a:r>
+              </a:p>
+            </p:txBody>
+          </p:sp>
+          <p:sp>
+            <p:nvSpPr>
+              <p:cNvPr id="29" name="TextBox 28"/>
+              <p:cNvSpPr txBox="1"/>
+              <p:nvPr/>
+            </p:nvSpPr>
+            <p:spPr>
+              <a:xfrm>
+                <a:off x="205840" y="927985"/>
+                <a:ext cx="4924746" cy="707886"/>
+              </a:xfrm>
+              <a:prstGeom prst="rect">
+                <a:avLst/>
+              </a:prstGeom>
+              <a:noFill/>
+            </p:spPr>
+            <p:txBody>
+              <a:bodyPr wrap="none" rtlCol="0">
+                <a:spAutoFit/>
+              </a:bodyPr>
+              <a:lstStyle/>
+              <a:p>
+                <a:r>
+                  <a:rPr lang="en-US" sz="4000" dirty="0" smtClean="0">
+                    <a:solidFill>
+                      <a:srgbClr val="FF0000"/>
+                    </a:solidFill>
+                    <a:latin typeface="Arial" panose="020B0604020202020204" pitchFamily="34" charset="0"/>
+                    <a:cs typeface="Arial" panose="020B0604020202020204" pitchFamily="34" charset="0"/>
+                  </a:rPr>
+                  <a:t>-  -  -  -  -  -  -  -  -  -  -</a:t>
+                </a:r>
+              </a:p>
+            </p:txBody>
+          </p:sp>
+          <p:cxnSp>
+            <p:nvCxnSpPr>
+              <p:cNvPr id="30" name="Straight Arrow Connector 29"/>
+              <p:cNvCxnSpPr/>
+              <p:nvPr/>
+            </p:nvCxnSpPr>
+            <p:spPr>
+              <a:xfrm>
+                <a:off x="5282807" y="1322067"/>
+                <a:ext cx="791570" cy="0"/>
+              </a:xfrm>
+              <a:prstGeom prst="straightConnector1">
+                <a:avLst/>
+              </a:prstGeom>
+              <a:ln w="60325">
+                <a:solidFill>
+                  <a:srgbClr val="FF0000"/>
+                </a:solidFill>
+                <a:tailEnd type="triangle"/>
+              </a:ln>
+            </p:spPr>
+            <p:style>
+              <a:lnRef idx="1">
+                <a:schemeClr val="accent1"/>
+              </a:lnRef>
+              <a:fillRef idx="0">
+                <a:schemeClr val="accent1"/>
+              </a:fillRef>
+              <a:effectRef idx="0">
+                <a:schemeClr val="accent1"/>
+              </a:effectRef>
+              <a:fontRef idx="minor">
+                <a:schemeClr val="tx1"/>
+              </a:fontRef>
+            </p:style>
+          </p:cxnSp>
+          <mc:AlternateContent xmlns:mc="http://schemas.openxmlformats.org/markup-compatibility/2006">
+            <mc:Choice xmlns:a14="http://schemas.microsoft.com/office/drawing/2010/main" Requires="a14">
+              <p:sp>
+                <p:nvSpPr>
+                  <p:cNvPr id="31" name="TextBox 30"/>
+                  <p:cNvSpPr txBox="1"/>
+                  <p:nvPr/>
+                </p:nvSpPr>
+                <p:spPr>
+                  <a:xfrm>
+                    <a:off x="5334237" y="645598"/>
+                    <a:ext cx="549958" cy="492443"/>
+                  </a:xfrm>
+                  <a:prstGeom prst="rect">
+                    <a:avLst/>
+                  </a:prstGeom>
+                  <a:noFill/>
+                </p:spPr>
+                <p:txBody>
+                  <a:bodyPr wrap="none" lIns="0" tIns="0" rIns="0" bIns="0" rtlCol="0">
+                    <a:spAutoFit/>
+                  </a:bodyPr>
+                  <a:lstStyle/>
+                  <a:p>
+                    <a:pPr/>
+                    <a14:m>
+                      <m:oMathPara xmlns:m="http://schemas.openxmlformats.org/officeDocument/2006/math">
+                        <m:oMathParaPr>
+                          <m:jc m:val="centerGroup"/>
+                        </m:oMathParaPr>
+                        <m:oMath xmlns:m="http://schemas.openxmlformats.org/officeDocument/2006/math">
+                          <m:sSub>
+                            <m:sSubPr>
+                              <m:ctrlPr>
+                                <a:rPr lang="en-US" sz="3200" b="0" i="1" smtClean="0">
+                                  <a:solidFill>
+                                    <a:srgbClr val="FF0000"/>
+                                  </a:solidFill>
+                                  <a:latin typeface="Cambria Math" panose="02040503050406030204" pitchFamily="18" charset="0"/>
+                                  <a:cs typeface="Arial" panose="020B0604020202020204" pitchFamily="34" charset="0"/>
+                                </a:rPr>
+                              </m:ctrlPr>
+                            </m:sSubPr>
+                            <m:e>
+                              <m:acc>
+                                <m:accPr>
+                                  <m:chr m:val="⃗"/>
+                                  <m:ctrlPr>
+                                    <a:rPr lang="en-US" sz="3200" b="0" i="1" smtClean="0">
+                                      <a:solidFill>
+                                        <a:srgbClr val="FF0000"/>
+                                      </a:solidFill>
+                                      <a:latin typeface="Cambria Math" panose="02040503050406030204" pitchFamily="18" charset="0"/>
+                                      <a:cs typeface="Arial" panose="020B0604020202020204" pitchFamily="34" charset="0"/>
+                                    </a:rPr>
+                                  </m:ctrlPr>
+                                </m:accPr>
+                                <m:e>
+                                  <m:r>
+                                    <a:rPr lang="en-US" sz="3200" b="0" i="1" smtClean="0">
+                                      <a:solidFill>
+                                        <a:srgbClr val="FF0000"/>
+                                      </a:solidFill>
+                                      <a:latin typeface="Cambria Math" panose="02040503050406030204" pitchFamily="18" charset="0"/>
+                                      <a:cs typeface="Arial" panose="020B0604020202020204" pitchFamily="34" charset="0"/>
+                                    </a:rPr>
+                                    <m:t>𝑣</m:t>
+                                  </m:r>
+                                </m:e>
+                              </m:acc>
+                            </m:e>
+                            <m:sub>
+                              <m:r>
+                                <a:rPr lang="en-US" sz="3200" b="0" i="1" smtClean="0">
+                                  <a:solidFill>
+                                    <a:srgbClr val="FF0000"/>
+                                  </a:solidFill>
+                                  <a:latin typeface="Cambria Math" panose="02040503050406030204" pitchFamily="18" charset="0"/>
+                                  <a:cs typeface="Arial" panose="020B0604020202020204" pitchFamily="34" charset="0"/>
+                                </a:rPr>
+                                <m:t>𝑑</m:t>
+                              </m:r>
+                            </m:sub>
+                          </m:sSub>
+                        </m:oMath>
+                      </m:oMathPara>
+                    </a14:m>
+                    <a:endParaRPr lang="en-US" sz="3200" dirty="0" smtClean="0">
+                      <a:solidFill>
+                        <a:srgbClr val="FF0000"/>
+                      </a:solidFill>
+                      <a:latin typeface="Arial" panose="020B0604020202020204" pitchFamily="34" charset="0"/>
+                      <a:cs typeface="Arial" panose="020B0604020202020204" pitchFamily="34" charset="0"/>
+                    </a:endParaRPr>
+                  </a:p>
+                </p:txBody>
+              </p:sp>
+            </mc:Choice>
+            <mc:Fallback>
+              <p:sp>
+                <p:nvSpPr>
+                  <p:cNvPr id="31" name="TextBox 30"/>
+                  <p:cNvSpPr txBox="1">
+                    <a:spLocks noRot="1" noChangeAspect="1" noMove="1" noResize="1" noEditPoints="1" noAdjustHandles="1" noChangeArrowheads="1" noChangeShapeType="1" noTextEdit="1"/>
+                  </p:cNvSpPr>
+                  <p:nvPr/>
+                </p:nvSpPr>
+                <p:spPr>
+                  <a:xfrm>
+                    <a:off x="5334237" y="645598"/>
+                    <a:ext cx="549958" cy="492443"/>
+                  </a:xfrm>
+                  <a:prstGeom prst="rect">
+                    <a:avLst/>
+                  </a:prstGeom>
+                  <a:blipFill>
+                    <a:blip r:embed="rId6"/>
+                    <a:stretch>
+                      <a:fillRect/>
+                    </a:stretch>
+                  </a:blipFill>
+                </p:spPr>
+                <p:txBody>
+                  <a:bodyPr/>
+                  <a:lstStyle/>
+                  <a:p>
+                    <a:r>
+                      <a:rPr lang="en-US">
+                        <a:noFill/>
+                      </a:rPr>
+                      <a:t> </a:t>
+                    </a:r>
+                  </a:p>
+                </p:txBody>
+              </p:sp>
+            </mc:Fallback>
+          </mc:AlternateContent>
+          <p:sp>
+            <p:nvSpPr>
+              <p:cNvPr id="32" name="Oval 31"/>
+              <p:cNvSpPr/>
+              <p:nvPr/>
+            </p:nvSpPr>
+            <p:spPr>
+              <a:xfrm>
+                <a:off x="2590751" y="2154580"/>
+                <a:ext cx="275265" cy="259307"/>
+              </a:xfrm>
+              <a:prstGeom prst="ellipse">
+                <a:avLst/>
+              </a:prstGeom>
+              <a:solidFill>
+                <a:schemeClr val="accent1"/>
+              </a:solidFill>
+              <a:ln w="38100">
+                <a:solidFill>
+                  <a:schemeClr val="accent1"/>
+                </a:solidFill>
+              </a:ln>
+            </p:spPr>
+            <p:txBody>
+              <a:bodyPr rot="0" spcFirstLastPara="0" vertOverflow="overflow" horzOverflow="overflow" vert="horz" wrap="square" lIns="91440" tIns="45720" rIns="91440" bIns="45720" numCol="1" spcCol="0" rtlCol="0" fromWordArt="0" anchor="ctr" anchorCtr="0" forceAA="0" compatLnSpc="1">
+                <a:prstTxWarp prst="textNoShape">
+                  <a:avLst/>
+                </a:prstTxWarp>
+                <a:spAutoFit/>
+              </a:bodyPr>
+              <a:lstStyle/>
+              <a:p>
+                <a:pPr marL="234950" indent="-234950" algn="ctr" fontAlgn="t">
+                  <a:buFont typeface="Arial" panose="020B0604020202020204" pitchFamily="34" charset="0"/>
+                  <a:buChar char="•"/>
+                </a:pPr>
+                <a:endParaRPr lang="en-US" dirty="0">
+                  <a:solidFill>
+                    <a:srgbClr val="353535"/>
+                  </a:solidFill>
+                  <a:latin typeface="arial" panose="020B0604020202020204" pitchFamily="34" charset="0"/>
+                </a:endParaRPr>
+              </a:p>
+            </p:txBody>
+          </p:sp>
+          <mc:AlternateContent xmlns:mc="http://schemas.openxmlformats.org/markup-compatibility/2006">
+            <mc:Choice xmlns:a14="http://schemas.microsoft.com/office/drawing/2010/main" Requires="a14">
+              <p:sp>
+                <p:nvSpPr>
+                  <p:cNvPr id="33" name="TextBox 32"/>
+                  <p:cNvSpPr txBox="1"/>
+                  <p:nvPr/>
+                </p:nvSpPr>
+                <p:spPr>
+                  <a:xfrm>
+                    <a:off x="2668213" y="1655454"/>
+                    <a:ext cx="619657" cy="430887"/>
+                  </a:xfrm>
+                  <a:prstGeom prst="rect">
+                    <a:avLst/>
+                  </a:prstGeom>
+                  <a:noFill/>
+                </p:spPr>
+                <p:txBody>
+                  <a:bodyPr wrap="none" lIns="0" tIns="0" rIns="0" bIns="0" rtlCol="0">
+                    <a:spAutoFit/>
+                  </a:bodyPr>
+                  <a:lstStyle/>
+                  <a:p>
+                    <a:pPr/>
+                    <a14:m>
+                      <m:oMathPara xmlns:m="http://schemas.openxmlformats.org/officeDocument/2006/math">
+                        <m:oMathParaPr>
+                          <m:jc m:val="centerGroup"/>
+                        </m:oMathParaPr>
+                        <m:oMath xmlns:m="http://schemas.openxmlformats.org/officeDocument/2006/math">
+                          <m:r>
+                            <a:rPr lang="en-US" sz="2800" b="0" i="1" smtClean="0">
+                              <a:solidFill>
+                                <a:schemeClr val="accent1"/>
+                              </a:solidFill>
+                              <a:latin typeface="Cambria Math" panose="02040503050406030204" pitchFamily="18" charset="0"/>
+                              <a:cs typeface="Arial" panose="020B0604020202020204" pitchFamily="34" charset="0"/>
+                            </a:rPr>
+                            <m:t>+</m:t>
+                          </m:r>
+                          <m:r>
+                            <a:rPr lang="en-US" sz="2800" b="0" i="1" smtClean="0">
+                              <a:solidFill>
+                                <a:schemeClr val="accent1"/>
+                              </a:solidFill>
+                              <a:latin typeface="Cambria Math" panose="02040503050406030204" pitchFamily="18" charset="0"/>
+                              <a:cs typeface="Arial" panose="020B0604020202020204" pitchFamily="34" charset="0"/>
+                            </a:rPr>
+                            <m:t>𝑄</m:t>
+                          </m:r>
+                        </m:oMath>
+                      </m:oMathPara>
+                    </a14:m>
+                    <a:endParaRPr lang="en-US" sz="2800" dirty="0" smtClean="0">
+                      <a:solidFill>
+                        <a:schemeClr val="accent1"/>
+                      </a:solidFill>
+                      <a:latin typeface="Arial" panose="020B0604020202020204" pitchFamily="34" charset="0"/>
+                      <a:cs typeface="Arial" panose="020B0604020202020204" pitchFamily="34" charset="0"/>
+                    </a:endParaRPr>
+                  </a:p>
+                </p:txBody>
+              </p:sp>
+            </mc:Choice>
+            <mc:Fallback>
+              <p:sp>
+                <p:nvSpPr>
+                  <p:cNvPr id="33" name="TextBox 32"/>
+                  <p:cNvSpPr txBox="1">
+                    <a:spLocks noRot="1" noChangeAspect="1" noMove="1" noResize="1" noEditPoints="1" noAdjustHandles="1" noChangeArrowheads="1" noChangeShapeType="1" noTextEdit="1"/>
+                  </p:cNvSpPr>
+                  <p:nvPr/>
+                </p:nvSpPr>
+                <p:spPr>
+                  <a:xfrm>
+                    <a:off x="2668213" y="1655454"/>
+                    <a:ext cx="619657" cy="430887"/>
+                  </a:xfrm>
+                  <a:prstGeom prst="rect">
+                    <a:avLst/>
+                  </a:prstGeom>
+                  <a:blipFill>
+                    <a:blip r:embed="rId7"/>
+                    <a:stretch>
+                      <a:fillRect/>
+                    </a:stretch>
+                  </a:blipFill>
+                </p:spPr>
+                <p:txBody>
+                  <a:bodyPr/>
+                  <a:lstStyle/>
+                  <a:p>
+                    <a:r>
+                      <a:rPr lang="en-US">
+                        <a:noFill/>
+                      </a:rPr>
+                      <a:t> </a:t>
+                    </a:r>
+                  </a:p>
+                </p:txBody>
+              </p:sp>
+            </mc:Fallback>
+          </mc:AlternateContent>
+          <p:sp>
+            <p:nvSpPr>
+              <p:cNvPr id="34" name="Oval 33"/>
+              <p:cNvSpPr/>
+              <p:nvPr/>
+            </p:nvSpPr>
+            <p:spPr>
+              <a:xfrm>
+                <a:off x="1379547" y="2154580"/>
+                <a:ext cx="395785" cy="382137"/>
+              </a:xfrm>
+              <a:prstGeom prst="ellipse">
+                <a:avLst/>
+              </a:prstGeom>
+              <a:ln w="38100">
+                <a:solidFill>
+                  <a:schemeClr val="tx1"/>
+                </a:solidFill>
+              </a:ln>
+            </p:spPr>
+            <p:txBody>
+              <a:bodyPr rot="0" spcFirstLastPara="0" vertOverflow="overflow" horzOverflow="overflow" vert="horz" wrap="square" lIns="91440" tIns="45720" rIns="91440" bIns="45720" numCol="1" spcCol="0" rtlCol="0" fromWordArt="0" anchor="ctr" anchorCtr="0" forceAA="0" compatLnSpc="1">
+                <a:prstTxWarp prst="textNoShape">
+                  <a:avLst/>
+                </a:prstTxWarp>
+                <a:spAutoFit/>
+              </a:bodyPr>
+              <a:lstStyle/>
+              <a:p>
+                <a:pPr marL="234950" indent="-234950" algn="ctr" fontAlgn="t">
+                  <a:buFont typeface="Arial" panose="020B0604020202020204" pitchFamily="34" charset="0"/>
+                  <a:buChar char="•"/>
+                </a:pPr>
+                <a:endParaRPr lang="en-US">
+                  <a:solidFill>
+                    <a:srgbClr val="353535"/>
+                  </a:solidFill>
+                  <a:latin typeface="arial" panose="020B0604020202020204" pitchFamily="34" charset="0"/>
+                </a:endParaRPr>
+              </a:p>
+            </p:txBody>
+          </p:sp>
+          <p:sp>
+            <p:nvSpPr>
+              <p:cNvPr id="35" name="Oval 34"/>
+              <p:cNvSpPr/>
+              <p:nvPr/>
+            </p:nvSpPr>
+            <p:spPr>
+              <a:xfrm>
+                <a:off x="1536496" y="2291057"/>
+                <a:ext cx="81886" cy="109182"/>
+              </a:xfrm>
+              <a:prstGeom prst="ellipse">
+                <a:avLst/>
+              </a:prstGeom>
+              <a:solidFill>
+                <a:schemeClr val="tx1"/>
+              </a:solidFill>
+              <a:ln w="38100">
+                <a:solidFill>
+                  <a:schemeClr val="tx1"/>
+                </a:solidFill>
+              </a:ln>
+            </p:spPr>
+            <p:txBody>
+              <a:bodyPr rot="0" spcFirstLastPara="0" vertOverflow="overflow" horzOverflow="overflow" vert="horz" wrap="square" lIns="91440" tIns="45720" rIns="91440" bIns="45720" numCol="1" spcCol="0" rtlCol="0" fromWordArt="0" anchor="ctr" anchorCtr="0" forceAA="0" compatLnSpc="1">
+                <a:prstTxWarp prst="textNoShape">
+                  <a:avLst/>
+                </a:prstTxWarp>
+                <a:spAutoFit/>
+              </a:bodyPr>
+              <a:lstStyle/>
+              <a:p>
+                <a:pPr marL="234950" indent="-234950" algn="ctr" fontAlgn="t">
+                  <a:buFont typeface="Arial" panose="020B0604020202020204" pitchFamily="34" charset="0"/>
+                  <a:buChar char="•"/>
+                </a:pPr>
+                <a:endParaRPr lang="en-US">
+                  <a:solidFill>
+                    <a:srgbClr val="353535"/>
+                  </a:solidFill>
+                  <a:latin typeface="arial" panose="020B0604020202020204" pitchFamily="34" charset="0"/>
+                </a:endParaRPr>
+              </a:p>
+            </p:txBody>
+          </p:sp>
+          <mc:AlternateContent xmlns:mc="http://schemas.openxmlformats.org/markup-compatibility/2006">
+            <mc:Choice xmlns:a14="http://schemas.microsoft.com/office/drawing/2010/main" Requires="a14">
+              <p:sp>
+                <p:nvSpPr>
+                  <p:cNvPr id="36" name="TextBox 35"/>
+                  <p:cNvSpPr txBox="1"/>
+                  <p:nvPr/>
+                </p:nvSpPr>
+                <p:spPr>
+                  <a:xfrm>
+                    <a:off x="1379547" y="2602162"/>
+                    <a:ext cx="394147" cy="552331"/>
+                  </a:xfrm>
+                  <a:prstGeom prst="rect">
+                    <a:avLst/>
+                  </a:prstGeom>
+                  <a:noFill/>
+                </p:spPr>
+                <p:txBody>
+                  <a:bodyPr wrap="none" lIns="0" tIns="0" rIns="0" bIns="0" rtlCol="0">
+                    <a:spAutoFit/>
+                  </a:bodyPr>
+                  <a:lstStyle/>
+                  <a:p>
+                    <a:pPr/>
+                    <a14:m>
+                      <m:oMathPara xmlns:m="http://schemas.openxmlformats.org/officeDocument/2006/math">
+                        <m:oMathParaPr>
+                          <m:jc m:val="centerGroup"/>
+                        </m:oMathParaPr>
+                        <m:oMath xmlns:m="http://schemas.openxmlformats.org/officeDocument/2006/math">
+                          <m:acc>
+                            <m:accPr>
+                              <m:chr m:val="⃗"/>
+                              <m:ctrlPr>
+                                <a:rPr lang="en-US" sz="3200" b="0" i="1" smtClean="0">
+                                  <a:latin typeface="Cambria Math" panose="02040503050406030204" pitchFamily="18" charset="0"/>
+                                  <a:cs typeface="Arial" panose="020B0604020202020204" pitchFamily="34" charset="0"/>
+                                </a:rPr>
+                              </m:ctrlPr>
+                            </m:accPr>
+                            <m:e>
+                              <m:r>
+                                <a:rPr lang="en-US" sz="3200" b="0" i="1" smtClean="0">
+                                  <a:latin typeface="Cambria Math" panose="02040503050406030204" pitchFamily="18" charset="0"/>
+                                  <a:cs typeface="Arial" panose="020B0604020202020204" pitchFamily="34" charset="0"/>
+                                </a:rPr>
+                                <m:t>𝐵</m:t>
+                              </m:r>
+                            </m:e>
+                          </m:acc>
+                        </m:oMath>
+                      </m:oMathPara>
+                    </a14:m>
+                    <a:endParaRPr lang="en-US" sz="3200" dirty="0" smtClean="0">
+                      <a:latin typeface="Arial" panose="020B0604020202020204" pitchFamily="34" charset="0"/>
+                      <a:cs typeface="Arial" panose="020B0604020202020204" pitchFamily="34" charset="0"/>
+                    </a:endParaRPr>
+                  </a:p>
+                </p:txBody>
+              </p:sp>
+            </mc:Choice>
+            <mc:Fallback>
+              <p:sp>
+                <p:nvSpPr>
+                  <p:cNvPr id="36" name="TextBox 35"/>
+                  <p:cNvSpPr txBox="1">
+                    <a:spLocks noRot="1" noChangeAspect="1" noMove="1" noResize="1" noEditPoints="1" noAdjustHandles="1" noChangeArrowheads="1" noChangeShapeType="1" noTextEdit="1"/>
+                  </p:cNvSpPr>
+                  <p:nvPr/>
+                </p:nvSpPr>
+                <p:spPr>
+                  <a:xfrm>
+                    <a:off x="1379547" y="2602162"/>
+                    <a:ext cx="394147" cy="552331"/>
+                  </a:xfrm>
+                  <a:prstGeom prst="rect">
+                    <a:avLst/>
+                  </a:prstGeom>
+                  <a:blipFill>
+                    <a:blip r:embed="rId8"/>
+                    <a:stretch>
+                      <a:fillRect/>
+                    </a:stretch>
+                  </a:blipFill>
+                </p:spPr>
+                <p:txBody>
+                  <a:bodyPr/>
+                  <a:lstStyle/>
+                  <a:p>
+                    <a:r>
+                      <a:rPr lang="en-US">
+                        <a:noFill/>
+                      </a:rPr>
+                      <a:t> </a:t>
+                    </a:r>
+                  </a:p>
+                </p:txBody>
+              </p:sp>
+            </mc:Fallback>
+          </mc:AlternateContent>
+          <p:cxnSp>
+            <p:nvCxnSpPr>
+              <p:cNvPr id="37" name="Straight Arrow Connector 36"/>
+              <p:cNvCxnSpPr/>
+              <p:nvPr/>
+            </p:nvCxnSpPr>
+            <p:spPr>
+              <a:xfrm flipH="1">
+                <a:off x="1618382" y="377102"/>
+                <a:ext cx="1080573" cy="0"/>
+              </a:xfrm>
+              <a:prstGeom prst="straightConnector1">
+                <a:avLst/>
+              </a:prstGeom>
+              <a:ln w="38100">
+                <a:solidFill>
+                  <a:schemeClr val="tx1"/>
+                </a:solidFill>
+                <a:tailEnd type="triangle"/>
+              </a:ln>
+            </p:spPr>
+            <p:style>
+              <a:lnRef idx="1">
+                <a:schemeClr val="accent1"/>
+              </a:lnRef>
+              <a:fillRef idx="0">
+                <a:schemeClr val="accent1"/>
+              </a:fillRef>
+              <a:effectRef idx="0">
+                <a:schemeClr val="accent1"/>
+              </a:effectRef>
+              <a:fontRef idx="minor">
+                <a:schemeClr val="tx1"/>
+              </a:fontRef>
+            </p:style>
+          </p:cxnSp>
+          <mc:AlternateContent xmlns:mc="http://schemas.openxmlformats.org/markup-compatibility/2006">
+            <mc:Choice xmlns:a14="http://schemas.microsoft.com/office/drawing/2010/main" Requires="a14">
+              <p:sp>
+                <p:nvSpPr>
+                  <p:cNvPr id="38" name="TextBox 37"/>
+                  <p:cNvSpPr txBox="1"/>
+                  <p:nvPr/>
+                </p:nvSpPr>
+                <p:spPr>
+                  <a:xfrm>
+                    <a:off x="2286001" y="69325"/>
+                    <a:ext cx="176459" cy="307777"/>
+                  </a:xfrm>
+                  <a:prstGeom prst="rect">
+                    <a:avLst/>
+                  </a:prstGeom>
+                  <a:noFill/>
+                </p:spPr>
+                <p:txBody>
+                  <a:bodyPr wrap="none" lIns="0" tIns="0" rIns="0" bIns="0" rtlCol="0">
+                    <a:spAutoFit/>
+                  </a:bodyPr>
+                  <a:lstStyle/>
+                  <a:p>
+                    <a14:m>
+                      <m:oMathPara xmlns:m="http://schemas.openxmlformats.org/officeDocument/2006/math">
+                        <m:oMathParaPr>
+                          <m:jc m:val="centerGroup"/>
+                        </m:oMathParaPr>
+                        <m:oMath xmlns:m="http://schemas.openxmlformats.org/officeDocument/2006/math">
+                          <m:r>
+                            <a:rPr lang="en-US" sz="2000" b="0" i="1" smtClean="0">
+                              <a:latin typeface="Cambria Math" panose="02040503050406030204" pitchFamily="18" charset="0"/>
+                              <a:cs typeface="Arial" panose="020B0604020202020204" pitchFamily="34" charset="0"/>
+                            </a:rPr>
+                            <m:t>𝐼</m:t>
+                          </m:r>
+                        </m:oMath>
+                      </m:oMathPara>
+                    </a14:m>
+                    <a:endParaRPr lang="en-US" sz="2000" dirty="0" smtClean="0">
+                      <a:latin typeface="Arial" panose="020B0604020202020204" pitchFamily="34" charset="0"/>
+                      <a:cs typeface="Arial" panose="020B0604020202020204" pitchFamily="34" charset="0"/>
+                    </a:endParaRPr>
+                  </a:p>
+                </p:txBody>
+              </p:sp>
+            </mc:Choice>
+            <mc:Fallback>
+              <p:sp>
+                <p:nvSpPr>
+                  <p:cNvPr id="38" name="TextBox 37"/>
+                  <p:cNvSpPr txBox="1">
+                    <a:spLocks noRot="1" noChangeAspect="1" noMove="1" noResize="1" noEditPoints="1" noAdjustHandles="1" noChangeArrowheads="1" noChangeShapeType="1" noTextEdit="1"/>
+                  </p:cNvSpPr>
+                  <p:nvPr/>
+                </p:nvSpPr>
+                <p:spPr>
+                  <a:xfrm>
+                    <a:off x="2286001" y="69325"/>
+                    <a:ext cx="176459" cy="307777"/>
+                  </a:xfrm>
+                  <a:prstGeom prst="rect">
+                    <a:avLst/>
+                  </a:prstGeom>
+                  <a:blipFill>
+                    <a:blip r:embed="rId9"/>
+                    <a:stretch>
+                      <a:fillRect l="-31034" r="-24138" b="-10000"/>
+                    </a:stretch>
+                  </a:blipFill>
+                </p:spPr>
+                <p:txBody>
+                  <a:bodyPr/>
+                  <a:lstStyle/>
+                  <a:p>
+                    <a:r>
+                      <a:rPr lang="en-US">
+                        <a:noFill/>
+                      </a:rPr>
+                      <a:t> </a:t>
+                    </a:r>
+                  </a:p>
+                </p:txBody>
+              </p:sp>
+            </mc:Fallback>
+          </mc:AlternateContent>
+        </p:grpSp>
+        <p:cxnSp>
+          <p:nvCxnSpPr>
+            <p:cNvPr id="39" name="Straight Arrow Connector 38"/>
+            <p:cNvCxnSpPr/>
+            <p:nvPr/>
+          </p:nvCxnSpPr>
+          <p:spPr>
+            <a:xfrm>
+              <a:off x="3224462" y="5878360"/>
+              <a:ext cx="791570" cy="0"/>
+            </a:xfrm>
+            <a:prstGeom prst="straightConnector1">
+              <a:avLst/>
+            </a:prstGeom>
+            <a:ln w="60325">
+              <a:solidFill>
+                <a:schemeClr val="accent1"/>
+              </a:solidFill>
+              <a:tailEnd type="triangle"/>
+            </a:ln>
+          </p:spPr>
+          <p:style>
+            <a:lnRef idx="1">
+              <a:schemeClr val="accent1"/>
+            </a:lnRef>
+            <a:fillRef idx="0">
+              <a:schemeClr val="accent1"/>
+            </a:fillRef>
+            <a:effectRef idx="0">
+              <a:schemeClr val="accent1"/>
+            </a:effectRef>
+            <a:fontRef idx="minor">
+              <a:schemeClr val="tx1"/>
+            </a:fontRef>
+          </p:style>
+        </p:cxnSp>
+        <mc:AlternateContent xmlns:mc="http://schemas.openxmlformats.org/markup-compatibility/2006">
+          <mc:Choice xmlns:a14="http://schemas.microsoft.com/office/drawing/2010/main" Requires="a14">
+            <p:sp>
+              <p:nvSpPr>
+                <p:cNvPr id="40" name="TextBox 39"/>
+                <p:cNvSpPr txBox="1"/>
+                <p:nvPr/>
+              </p:nvSpPr>
+              <p:spPr>
+                <a:xfrm>
+                  <a:off x="4016032" y="5391357"/>
+                  <a:ext cx="549958" cy="492443"/>
+                </a:xfrm>
+                <a:prstGeom prst="rect">
+                  <a:avLst/>
+                </a:prstGeom>
+                <a:noFill/>
+              </p:spPr>
+              <p:txBody>
+                <a:bodyPr wrap="none" lIns="0" tIns="0" rIns="0" bIns="0" rtlCol="0">
+                  <a:spAutoFit/>
+                </a:bodyPr>
+                <a:lstStyle/>
+                <a:p>
+                  <a:pPr/>
+                  <a14:m>
+                    <m:oMathPara xmlns:m="http://schemas.openxmlformats.org/officeDocument/2006/math">
+                      <m:oMathParaPr>
+                        <m:jc m:val="centerGroup"/>
+                      </m:oMathParaPr>
+                      <m:oMath xmlns:m="http://schemas.openxmlformats.org/officeDocument/2006/math">
+                        <m:sSub>
+                          <m:sSubPr>
+                            <m:ctrlPr>
+                              <a:rPr lang="en-US" sz="3200" b="0" i="1" smtClean="0">
+                                <a:solidFill>
+                                  <a:schemeClr val="accent1"/>
+                                </a:solidFill>
+                                <a:latin typeface="Cambria Math" panose="02040503050406030204" pitchFamily="18" charset="0"/>
+                                <a:cs typeface="Arial" panose="020B0604020202020204" pitchFamily="34" charset="0"/>
+                              </a:rPr>
+                            </m:ctrlPr>
+                          </m:sSubPr>
+                          <m:e>
+                            <m:acc>
+                              <m:accPr>
+                                <m:chr m:val="⃗"/>
+                                <m:ctrlPr>
+                                  <a:rPr lang="en-US" sz="3200" b="0" i="1" smtClean="0">
+                                    <a:solidFill>
+                                      <a:schemeClr val="accent1"/>
+                                    </a:solidFill>
+                                    <a:latin typeface="Cambria Math" panose="02040503050406030204" pitchFamily="18" charset="0"/>
+                                    <a:cs typeface="Arial" panose="020B0604020202020204" pitchFamily="34" charset="0"/>
+                                  </a:rPr>
+                                </m:ctrlPr>
+                              </m:accPr>
+                              <m:e>
+                                <m:r>
+                                  <a:rPr lang="en-US" sz="3200" b="0" i="1" smtClean="0">
+                                    <a:solidFill>
+                                      <a:schemeClr val="accent1"/>
+                                    </a:solidFill>
+                                    <a:latin typeface="Cambria Math" panose="02040503050406030204" pitchFamily="18" charset="0"/>
+                                    <a:cs typeface="Arial" panose="020B0604020202020204" pitchFamily="34" charset="0"/>
+                                  </a:rPr>
+                                  <m:t>𝑣</m:t>
+                                </m:r>
+                              </m:e>
+                            </m:acc>
+                          </m:e>
+                          <m:sub>
+                            <m:r>
+                              <a:rPr lang="en-US" sz="3200" b="0" i="1" smtClean="0">
+                                <a:solidFill>
+                                  <a:schemeClr val="accent1"/>
+                                </a:solidFill>
+                                <a:latin typeface="Cambria Math" panose="02040503050406030204" pitchFamily="18" charset="0"/>
+                                <a:cs typeface="Arial" panose="020B0604020202020204" pitchFamily="34" charset="0"/>
+                              </a:rPr>
+                              <m:t>𝑑</m:t>
+                            </m:r>
+                          </m:sub>
+                        </m:sSub>
+                      </m:oMath>
+                    </m:oMathPara>
+                  </a14:m>
+                  <a:endParaRPr lang="en-US" sz="3200" dirty="0" smtClean="0">
+                    <a:solidFill>
+                      <a:schemeClr val="accent1"/>
+                    </a:solidFill>
+                    <a:latin typeface="Arial" panose="020B0604020202020204" pitchFamily="34" charset="0"/>
+                    <a:cs typeface="Arial" panose="020B0604020202020204" pitchFamily="34" charset="0"/>
+                  </a:endParaRPr>
+                </a:p>
+              </p:txBody>
+            </p:sp>
+          </mc:Choice>
+          <mc:Fallback>
+            <p:sp>
+              <p:nvSpPr>
+                <p:cNvPr id="40" name="TextBox 39"/>
+                <p:cNvSpPr txBox="1">
+                  <a:spLocks noRot="1" noChangeAspect="1" noMove="1" noResize="1" noEditPoints="1" noAdjustHandles="1" noChangeArrowheads="1" noChangeShapeType="1" noTextEdit="1"/>
+                </p:cNvSpPr>
+                <p:nvPr/>
+              </p:nvSpPr>
+              <p:spPr>
+                <a:xfrm>
+                  <a:off x="4016032" y="5391357"/>
+                  <a:ext cx="549958" cy="492443"/>
+                </a:xfrm>
+                <a:prstGeom prst="rect">
+                  <a:avLst/>
+                </a:prstGeom>
+                <a:blipFill>
+                  <a:blip r:embed="rId10"/>
+                  <a:stretch>
+                    <a:fillRect/>
+                  </a:stretch>
+                </a:blipFill>
+              </p:spPr>
+              <p:txBody>
+                <a:bodyPr/>
+                <a:lstStyle/>
+                <a:p>
+                  <a:r>
+                    <a:rPr lang="en-US">
+                      <a:noFill/>
+                    </a:rPr>
+                    <a:t> </a:t>
+                  </a:r>
+                </a:p>
+              </p:txBody>
+            </p:sp>
+          </mc:Fallback>
+        </mc:AlternateContent>
+        <p:cxnSp>
+          <p:nvCxnSpPr>
+            <p:cNvPr id="42" name="Straight Arrow Connector 41"/>
+            <p:cNvCxnSpPr>
+              <a:stCxn id="32" idx="4"/>
+            </p:cNvCxnSpPr>
+            <p:nvPr/>
+          </p:nvCxnSpPr>
+          <p:spPr>
+            <a:xfrm flipH="1">
+              <a:off x="3086830" y="6001190"/>
+              <a:ext cx="1" cy="612261"/>
+            </a:xfrm>
+            <a:prstGeom prst="straightConnector1">
+              <a:avLst/>
+            </a:prstGeom>
+            <a:ln w="57150">
+              <a:solidFill>
+                <a:schemeClr val="tx1"/>
+              </a:solidFill>
+              <a:tailEnd type="triangle"/>
+            </a:ln>
+          </p:spPr>
+          <p:style>
+            <a:lnRef idx="1">
+              <a:schemeClr val="accent1"/>
+            </a:lnRef>
+            <a:fillRef idx="0">
+              <a:schemeClr val="accent1"/>
+            </a:fillRef>
+            <a:effectRef idx="0">
+              <a:schemeClr val="accent1"/>
+            </a:effectRef>
+            <a:fontRef idx="minor">
+              <a:schemeClr val="tx1"/>
+            </a:fontRef>
+          </p:style>
+        </p:cxnSp>
+        <mc:AlternateContent xmlns:mc="http://schemas.openxmlformats.org/markup-compatibility/2006">
+          <mc:Choice xmlns:a14="http://schemas.microsoft.com/office/drawing/2010/main" Requires="a14">
+            <p:sp>
+              <p:nvSpPr>
+                <p:cNvPr id="43" name="TextBox 42"/>
+                <p:cNvSpPr txBox="1"/>
+                <p:nvPr/>
+              </p:nvSpPr>
+              <p:spPr>
+                <a:xfrm>
+                  <a:off x="3175844" y="6083077"/>
+                  <a:ext cx="341888" cy="345159"/>
+                </a:xfrm>
+                <a:prstGeom prst="rect">
+                  <a:avLst/>
+                </a:prstGeom>
+                <a:noFill/>
+              </p:spPr>
+              <p:txBody>
+                <a:bodyPr wrap="none" lIns="0" tIns="0" rIns="0" bIns="0" rtlCol="0">
+                  <a:spAutoFit/>
+                </a:bodyPr>
+                <a:lstStyle/>
+                <a:p>
+                  <a14:m>
+                    <m:oMathPara xmlns:m="http://schemas.openxmlformats.org/officeDocument/2006/math">
+                      <m:oMathParaPr>
+                        <m:jc m:val="centerGroup"/>
+                      </m:oMathParaPr>
+                      <m:oMath xmlns:m="http://schemas.openxmlformats.org/officeDocument/2006/math">
+                        <m:sSub>
+                          <m:sSubPr>
+                            <m:ctrlPr>
+                              <a:rPr lang="en-US" sz="2000" b="0" i="1" smtClean="0">
+                                <a:latin typeface="Cambria Math" panose="02040503050406030204" pitchFamily="18" charset="0"/>
+                                <a:cs typeface="Arial" panose="020B0604020202020204" pitchFamily="34" charset="0"/>
+                              </a:rPr>
+                            </m:ctrlPr>
+                          </m:sSubPr>
+                          <m:e>
+                            <m:acc>
+                              <m:accPr>
+                                <m:chr m:val="⃗"/>
+                                <m:ctrlPr>
+                                  <a:rPr lang="en-US" sz="2000" b="0" i="1" smtClean="0">
+                                    <a:latin typeface="Cambria Math" panose="02040503050406030204" pitchFamily="18" charset="0"/>
+                                    <a:cs typeface="Arial" panose="020B0604020202020204" pitchFamily="34" charset="0"/>
+                                  </a:rPr>
+                                </m:ctrlPr>
+                              </m:accPr>
+                              <m:e>
+                                <m:r>
+                                  <a:rPr lang="en-US" sz="2000" b="0" i="1" smtClean="0">
+                                    <a:latin typeface="Cambria Math" panose="02040503050406030204" pitchFamily="18" charset="0"/>
+                                    <a:cs typeface="Arial" panose="020B0604020202020204" pitchFamily="34" charset="0"/>
+                                  </a:rPr>
+                                  <m:t>𝐹</m:t>
+                                </m:r>
+                              </m:e>
+                            </m:acc>
+                          </m:e>
+                          <m:sub>
+                            <m:r>
+                              <a:rPr lang="en-US" sz="2000" b="0" i="1" smtClean="0">
+                                <a:latin typeface="Cambria Math" panose="02040503050406030204" pitchFamily="18" charset="0"/>
+                                <a:cs typeface="Arial" panose="020B0604020202020204" pitchFamily="34" charset="0"/>
+                              </a:rPr>
+                              <m:t>𝐵</m:t>
+                            </m:r>
+                          </m:sub>
+                        </m:sSub>
+                      </m:oMath>
+                    </m:oMathPara>
+                  </a14:m>
+                  <a:endParaRPr lang="en-US" sz="2000" dirty="0" smtClean="0">
+                    <a:latin typeface="Arial" panose="020B0604020202020204" pitchFamily="34" charset="0"/>
+                    <a:cs typeface="Arial" panose="020B0604020202020204" pitchFamily="34" charset="0"/>
+                  </a:endParaRPr>
+                </a:p>
+              </p:txBody>
+            </p:sp>
+          </mc:Choice>
+          <mc:Fallback>
+            <p:sp>
+              <p:nvSpPr>
+                <p:cNvPr id="43" name="TextBox 42"/>
+                <p:cNvSpPr txBox="1">
+                  <a:spLocks noRot="1" noChangeAspect="1" noMove="1" noResize="1" noEditPoints="1" noAdjustHandles="1" noChangeArrowheads="1" noChangeShapeType="1" noTextEdit="1"/>
+                </p:cNvSpPr>
+                <p:nvPr/>
+              </p:nvSpPr>
+              <p:spPr>
+                <a:xfrm>
+                  <a:off x="3175844" y="6083077"/>
+                  <a:ext cx="341888" cy="345159"/>
+                </a:xfrm>
+                <a:prstGeom prst="rect">
+                  <a:avLst/>
+                </a:prstGeom>
+                <a:blipFill>
+                  <a:blip r:embed="rId11"/>
+                  <a:stretch>
+                    <a:fillRect l="-16071" t="-35088" r="-62500" b="-15789"/>
+                  </a:stretch>
+                </a:blipFill>
+              </p:spPr>
+              <p:txBody>
+                <a:bodyPr/>
+                <a:lstStyle/>
+                <a:p>
+                  <a:r>
+                    <a:rPr lang="en-US">
+                      <a:noFill/>
+                    </a:rPr>
+                    <a:t> </a:t>
+                  </a:r>
+                </a:p>
+              </p:txBody>
+            </p:sp>
+          </mc:Fallback>
+        </mc:AlternateContent>
+      </p:grpSp>
+      <p:grpSp>
+        <p:nvGrpSpPr>
+          <p:cNvPr id="48" name="Group 47"/>
+          <p:cNvGrpSpPr/>
+          <p:nvPr/>
+        </p:nvGrpSpPr>
+        <p:grpSpPr>
+          <a:xfrm>
+            <a:off x="6432824" y="195442"/>
+            <a:ext cx="5759176" cy="2686819"/>
+            <a:chOff x="6432824" y="195442"/>
+            <a:chExt cx="5759176" cy="2686819"/>
+          </a:xfrm>
+        </p:grpSpPr>
+        <p:grpSp>
+          <p:nvGrpSpPr>
+            <p:cNvPr id="45" name="Group 44"/>
+            <p:cNvGrpSpPr/>
+            <p:nvPr/>
+          </p:nvGrpSpPr>
+          <p:grpSpPr>
+            <a:xfrm>
+              <a:off x="6432824" y="369693"/>
+              <a:ext cx="5759176" cy="1900307"/>
+              <a:chOff x="6432824" y="369693"/>
+              <a:chExt cx="5759176" cy="1900307"/>
+            </a:xfrm>
+          </p:grpSpPr>
+          <p:sp>
+            <p:nvSpPr>
+              <p:cNvPr id="12" name="Rectangle 11"/>
+              <p:cNvSpPr/>
+              <p:nvPr/>
+            </p:nvSpPr>
+            <p:spPr>
+              <a:xfrm>
+                <a:off x="7239000" y="369693"/>
+                <a:ext cx="4953000" cy="1122291"/>
+              </a:xfrm>
+              <a:prstGeom prst="rect">
+                <a:avLst/>
+              </a:prstGeom>
+              <a:ln w="38100">
+                <a:solidFill>
+                  <a:schemeClr val="tx1"/>
+                </a:solidFill>
+              </a:ln>
+            </p:spPr>
+            <p:txBody>
+              <a:bodyPr rot="0" spcFirstLastPara="0" vertOverflow="overflow" horzOverflow="overflow" vert="horz" wrap="square" lIns="91440" tIns="45720" rIns="91440" bIns="45720" numCol="1" spcCol="0" rtlCol="0" fromWordArt="0" anchor="ctr" anchorCtr="0" forceAA="0" compatLnSpc="1">
+                <a:prstTxWarp prst="textNoShape">
+                  <a:avLst/>
+                </a:prstTxWarp>
+                <a:spAutoFit/>
+              </a:bodyPr>
+              <a:lstStyle/>
+              <a:p>
+                <a:pPr marL="234950" indent="-234950" algn="ctr" fontAlgn="t">
+                  <a:buFont typeface="Arial" panose="020B0604020202020204" pitchFamily="34" charset="0"/>
+                  <a:buChar char="•"/>
+                </a:pPr>
+                <a:endParaRPr lang="en-US">
+                  <a:solidFill>
+                    <a:srgbClr val="353535"/>
+                  </a:solidFill>
+                  <a:latin typeface="arial" panose="020B0604020202020204" pitchFamily="34" charset="0"/>
+                </a:endParaRPr>
+              </a:p>
+            </p:txBody>
+          </p:sp>
+          <p:sp>
+            <p:nvSpPr>
+              <p:cNvPr id="13" name="TextBox 12"/>
+              <p:cNvSpPr txBox="1"/>
+              <p:nvPr/>
+            </p:nvSpPr>
+            <p:spPr>
+              <a:xfrm>
+                <a:off x="7169553" y="369693"/>
+                <a:ext cx="4980851" cy="707886"/>
+              </a:xfrm>
+              <a:prstGeom prst="rect">
+                <a:avLst/>
+              </a:prstGeom>
+              <a:noFill/>
+            </p:spPr>
+            <p:txBody>
+              <a:bodyPr wrap="none" rtlCol="0">
+                <a:spAutoFit/>
+              </a:bodyPr>
+              <a:lstStyle/>
+              <a:p>
+                <a:r>
+                  <a:rPr lang="en-US" sz="4000" dirty="0" smtClean="0">
+                    <a:solidFill>
+                      <a:schemeClr val="accent1"/>
+                    </a:solidFill>
+                    <a:latin typeface="Arial" panose="020B0604020202020204" pitchFamily="34" charset="0"/>
+                    <a:cs typeface="Arial" panose="020B0604020202020204" pitchFamily="34" charset="0"/>
+                  </a:rPr>
+                  <a:t>++++++++++++++++</a:t>
+                </a:r>
+              </a:p>
+            </p:txBody>
+          </p:sp>
+          <p:sp>
+            <p:nvSpPr>
+              <p:cNvPr id="14" name="TextBox 13"/>
+              <p:cNvSpPr txBox="1"/>
+              <p:nvPr/>
+            </p:nvSpPr>
+            <p:spPr>
+              <a:xfrm>
+                <a:off x="7239000" y="784098"/>
+                <a:ext cx="4780476" cy="707886"/>
+              </a:xfrm>
+              <a:prstGeom prst="rect">
+                <a:avLst/>
+              </a:prstGeom>
+              <a:noFill/>
+            </p:spPr>
+            <p:txBody>
+              <a:bodyPr wrap="none" rtlCol="0">
+                <a:spAutoFit/>
+              </a:bodyPr>
+              <a:lstStyle/>
+              <a:p>
+                <a:r>
+                  <a:rPr lang="en-US" sz="4000" dirty="0" smtClean="0">
+                    <a:solidFill>
+                      <a:srgbClr val="FF0000"/>
+                    </a:solidFill>
+                    <a:latin typeface="Arial" panose="020B0604020202020204" pitchFamily="34" charset="0"/>
+                    <a:cs typeface="Arial" panose="020B0604020202020204" pitchFamily="34" charset="0"/>
+                  </a:rPr>
+                  <a:t>-     -     -     -     -     -</a:t>
+                </a:r>
+              </a:p>
+            </p:txBody>
+          </p:sp>
+          <p:sp>
+            <p:nvSpPr>
+              <p:cNvPr id="15" name="Oval 14"/>
+              <p:cNvSpPr/>
+              <p:nvPr/>
+            </p:nvSpPr>
+            <p:spPr>
+              <a:xfrm>
+                <a:off x="9623911" y="2010693"/>
+                <a:ext cx="275265" cy="259307"/>
+              </a:xfrm>
+              <a:prstGeom prst="ellipse">
+                <a:avLst/>
+              </a:prstGeom>
+              <a:solidFill>
+                <a:schemeClr val="accent1"/>
+              </a:solidFill>
+              <a:ln w="38100">
+                <a:solidFill>
+                  <a:schemeClr val="accent1"/>
+                </a:solidFill>
+              </a:ln>
+            </p:spPr>
+            <p:txBody>
+              <a:bodyPr rot="0" spcFirstLastPara="0" vertOverflow="overflow" horzOverflow="overflow" vert="horz" wrap="square" lIns="91440" tIns="45720" rIns="91440" bIns="45720" numCol="1" spcCol="0" rtlCol="0" fromWordArt="0" anchor="ctr" anchorCtr="0" forceAA="0" compatLnSpc="1">
+                <a:prstTxWarp prst="textNoShape">
+                  <a:avLst/>
+                </a:prstTxWarp>
+                <a:spAutoFit/>
+              </a:bodyPr>
+              <a:lstStyle/>
+              <a:p>
+                <a:pPr marL="234950" indent="-234950" algn="ctr" fontAlgn="t">
+                  <a:buFont typeface="Arial" panose="020B0604020202020204" pitchFamily="34" charset="0"/>
+                  <a:buChar char="•"/>
+                </a:pPr>
+                <a:endParaRPr lang="en-US" dirty="0">
+                  <a:solidFill>
+                    <a:srgbClr val="353535"/>
+                  </a:solidFill>
+                  <a:latin typeface="arial" panose="020B0604020202020204" pitchFamily="34" charset="0"/>
+                </a:endParaRPr>
+              </a:p>
+            </p:txBody>
+          </p:sp>
+          <mc:AlternateContent xmlns:mc="http://schemas.openxmlformats.org/markup-compatibility/2006">
+            <mc:Choice xmlns:a14="http://schemas.microsoft.com/office/drawing/2010/main" Requires="a14">
+              <p:sp>
+                <p:nvSpPr>
+                  <p:cNvPr id="16" name="TextBox 15"/>
+                  <p:cNvSpPr txBox="1"/>
+                  <p:nvPr/>
+                </p:nvSpPr>
+                <p:spPr>
+                  <a:xfrm>
+                    <a:off x="9899176" y="1695061"/>
+                    <a:ext cx="619657" cy="430887"/>
+                  </a:xfrm>
+                  <a:prstGeom prst="rect">
+                    <a:avLst/>
+                  </a:prstGeom>
+                  <a:noFill/>
+                </p:spPr>
+                <p:txBody>
+                  <a:bodyPr wrap="none" lIns="0" tIns="0" rIns="0" bIns="0" rtlCol="0">
+                    <a:spAutoFit/>
+                  </a:bodyPr>
+                  <a:lstStyle/>
+                  <a:p>
+                    <a:pPr/>
+                    <a14:m>
+                      <m:oMathPara xmlns:m="http://schemas.openxmlformats.org/officeDocument/2006/math">
+                        <m:oMathParaPr>
+                          <m:jc m:val="centerGroup"/>
+                        </m:oMathParaPr>
+                        <m:oMath xmlns:m="http://schemas.openxmlformats.org/officeDocument/2006/math">
+                          <m:r>
+                            <a:rPr lang="en-US" sz="2800" b="0" i="1" smtClean="0">
+                              <a:solidFill>
+                                <a:schemeClr val="accent1"/>
+                              </a:solidFill>
+                              <a:latin typeface="Cambria Math" panose="02040503050406030204" pitchFamily="18" charset="0"/>
+                              <a:cs typeface="Arial" panose="020B0604020202020204" pitchFamily="34" charset="0"/>
+                            </a:rPr>
+                            <m:t>+</m:t>
+                          </m:r>
+                          <m:r>
+                            <a:rPr lang="en-US" sz="2800" b="0" i="1" smtClean="0">
+                              <a:solidFill>
+                                <a:schemeClr val="accent1"/>
+                              </a:solidFill>
+                              <a:latin typeface="Cambria Math" panose="02040503050406030204" pitchFamily="18" charset="0"/>
+                              <a:cs typeface="Arial" panose="020B0604020202020204" pitchFamily="34" charset="0"/>
+                            </a:rPr>
+                            <m:t>𝑄</m:t>
+                          </m:r>
+                        </m:oMath>
+                      </m:oMathPara>
+                    </a14:m>
+                    <a:endParaRPr lang="en-US" sz="2800" dirty="0" smtClean="0">
+                      <a:solidFill>
+                        <a:schemeClr val="accent1"/>
+                      </a:solidFill>
+                      <a:latin typeface="Arial" panose="020B0604020202020204" pitchFamily="34" charset="0"/>
+                      <a:cs typeface="Arial" panose="020B0604020202020204" pitchFamily="34" charset="0"/>
+                    </a:endParaRPr>
+                  </a:p>
+                </p:txBody>
+              </p:sp>
+            </mc:Choice>
+            <mc:Fallback>
+              <p:sp>
+                <p:nvSpPr>
+                  <p:cNvPr id="16" name="TextBox 15"/>
+                  <p:cNvSpPr txBox="1">
+                    <a:spLocks noRot="1" noChangeAspect="1" noMove="1" noResize="1" noEditPoints="1" noAdjustHandles="1" noChangeArrowheads="1" noChangeShapeType="1" noTextEdit="1"/>
+                  </p:cNvSpPr>
+                  <p:nvPr/>
+                </p:nvSpPr>
+                <p:spPr>
+                  <a:xfrm>
+                    <a:off x="9899176" y="1695061"/>
+                    <a:ext cx="619657" cy="430887"/>
+                  </a:xfrm>
+                  <a:prstGeom prst="rect">
+                    <a:avLst/>
+                  </a:prstGeom>
+                  <a:blipFill>
+                    <a:blip r:embed="rId12"/>
+                    <a:stretch>
+                      <a:fillRect/>
+                    </a:stretch>
+                  </a:blipFill>
+                </p:spPr>
+                <p:txBody>
+                  <a:bodyPr/>
+                  <a:lstStyle/>
+                  <a:p>
+                    <a:r>
+                      <a:rPr lang="en-US">
+                        <a:noFill/>
+                      </a:rPr>
+                      <a:t> </a:t>
+                    </a:r>
+                  </a:p>
+                </p:txBody>
+              </p:sp>
+            </mc:Fallback>
+          </mc:AlternateContent>
+          <p:cxnSp>
+            <p:nvCxnSpPr>
+              <p:cNvPr id="17" name="Straight Arrow Connector 16"/>
+              <p:cNvCxnSpPr/>
+              <p:nvPr/>
+            </p:nvCxnSpPr>
+            <p:spPr>
+              <a:xfrm flipH="1">
+                <a:off x="6432824" y="766466"/>
+                <a:ext cx="777922" cy="0"/>
+              </a:xfrm>
+              <a:prstGeom prst="straightConnector1">
+                <a:avLst/>
+              </a:prstGeom>
+              <a:ln w="60325">
+                <a:solidFill>
+                  <a:schemeClr val="accent1"/>
+                </a:solidFill>
+                <a:tailEnd type="triangle"/>
+              </a:ln>
+            </p:spPr>
+            <p:style>
+              <a:lnRef idx="1">
+                <a:schemeClr val="accent1"/>
+              </a:lnRef>
+              <a:fillRef idx="0">
+                <a:schemeClr val="accent1"/>
+              </a:fillRef>
+              <a:effectRef idx="0">
+                <a:schemeClr val="accent1"/>
+              </a:effectRef>
+              <a:fontRef idx="minor">
+                <a:schemeClr val="tx1"/>
+              </a:fontRef>
+            </p:style>
+          </p:cxnSp>
+        </p:grpSp>
+        <mc:AlternateContent xmlns:mc="http://schemas.openxmlformats.org/markup-compatibility/2006">
+          <mc:Choice xmlns:a14="http://schemas.microsoft.com/office/drawing/2010/main" Requires="a14">
+            <p:sp>
+              <p:nvSpPr>
+                <p:cNvPr id="18" name="TextBox 17"/>
+                <p:cNvSpPr txBox="1"/>
+                <p:nvPr/>
+              </p:nvSpPr>
+              <p:spPr>
+                <a:xfrm>
+                  <a:off x="6619595" y="195442"/>
+                  <a:ext cx="549958" cy="492443"/>
+                </a:xfrm>
+                <a:prstGeom prst="rect">
+                  <a:avLst/>
+                </a:prstGeom>
+                <a:noFill/>
+              </p:spPr>
+              <p:txBody>
+                <a:bodyPr wrap="none" lIns="0" tIns="0" rIns="0" bIns="0" rtlCol="0">
+                  <a:spAutoFit/>
+                </a:bodyPr>
+                <a:lstStyle/>
+                <a:p>
+                  <a:pPr/>
+                  <a14:m>
+                    <m:oMathPara xmlns:m="http://schemas.openxmlformats.org/officeDocument/2006/math">
+                      <m:oMathParaPr>
+                        <m:jc m:val="centerGroup"/>
+                      </m:oMathParaPr>
+                      <m:oMath xmlns:m="http://schemas.openxmlformats.org/officeDocument/2006/math">
+                        <m:sSub>
+                          <m:sSubPr>
+                            <m:ctrlPr>
+                              <a:rPr lang="en-US" sz="3200" b="0" i="1" smtClean="0">
+                                <a:solidFill>
+                                  <a:schemeClr val="accent1"/>
+                                </a:solidFill>
+                                <a:latin typeface="Cambria Math" panose="02040503050406030204" pitchFamily="18" charset="0"/>
+                                <a:cs typeface="Arial" panose="020B0604020202020204" pitchFamily="34" charset="0"/>
+                              </a:rPr>
+                            </m:ctrlPr>
+                          </m:sSubPr>
+                          <m:e>
+                            <m:acc>
+                              <m:accPr>
+                                <m:chr m:val="⃗"/>
+                                <m:ctrlPr>
+                                  <a:rPr lang="en-US" sz="3200" b="0" i="1" smtClean="0">
+                                    <a:solidFill>
+                                      <a:schemeClr val="accent1"/>
+                                    </a:solidFill>
+                                    <a:latin typeface="Cambria Math" panose="02040503050406030204" pitchFamily="18" charset="0"/>
+                                    <a:cs typeface="Arial" panose="020B0604020202020204" pitchFamily="34" charset="0"/>
+                                  </a:rPr>
+                                </m:ctrlPr>
+                              </m:accPr>
+                              <m:e>
+                                <m:r>
+                                  <a:rPr lang="en-US" sz="3200" b="0" i="1" smtClean="0">
+                                    <a:solidFill>
+                                      <a:schemeClr val="accent1"/>
+                                    </a:solidFill>
+                                    <a:latin typeface="Cambria Math" panose="02040503050406030204" pitchFamily="18" charset="0"/>
+                                    <a:cs typeface="Arial" panose="020B0604020202020204" pitchFamily="34" charset="0"/>
+                                  </a:rPr>
+                                  <m:t>𝑣</m:t>
+                                </m:r>
+                              </m:e>
+                            </m:acc>
+                          </m:e>
+                          <m:sub>
+                            <m:r>
+                              <a:rPr lang="en-US" sz="3200" b="0" i="1" smtClean="0">
+                                <a:solidFill>
+                                  <a:schemeClr val="accent1"/>
+                                </a:solidFill>
+                                <a:latin typeface="Cambria Math" panose="02040503050406030204" pitchFamily="18" charset="0"/>
+                                <a:cs typeface="Arial" panose="020B0604020202020204" pitchFamily="34" charset="0"/>
+                              </a:rPr>
+                              <m:t>𝑑</m:t>
+                            </m:r>
+                          </m:sub>
+                        </m:sSub>
+                      </m:oMath>
+                    </m:oMathPara>
+                  </a14:m>
+                  <a:endParaRPr lang="en-US" sz="3200" dirty="0" smtClean="0">
+                    <a:solidFill>
+                      <a:schemeClr val="accent1"/>
+                    </a:solidFill>
+                    <a:latin typeface="Arial" panose="020B0604020202020204" pitchFamily="34" charset="0"/>
+                    <a:cs typeface="Arial" panose="020B0604020202020204" pitchFamily="34" charset="0"/>
+                  </a:endParaRPr>
+                </a:p>
+              </p:txBody>
+            </p:sp>
+          </mc:Choice>
+          <mc:Fallback>
+            <p:sp>
+              <p:nvSpPr>
+                <p:cNvPr id="18" name="TextBox 17"/>
+                <p:cNvSpPr txBox="1">
+                  <a:spLocks noRot="1" noChangeAspect="1" noMove="1" noResize="1" noEditPoints="1" noAdjustHandles="1" noChangeArrowheads="1" noChangeShapeType="1" noTextEdit="1"/>
+                </p:cNvSpPr>
+                <p:nvPr/>
+              </p:nvSpPr>
+              <p:spPr>
+                <a:xfrm>
+                  <a:off x="6619595" y="195442"/>
+                  <a:ext cx="549958" cy="492443"/>
+                </a:xfrm>
+                <a:prstGeom prst="rect">
+                  <a:avLst/>
+                </a:prstGeom>
+                <a:blipFill>
+                  <a:blip r:embed="rId13"/>
+                  <a:stretch>
+                    <a:fillRect/>
+                  </a:stretch>
+                </a:blipFill>
+              </p:spPr>
+              <p:txBody>
+                <a:bodyPr/>
+                <a:lstStyle/>
+                <a:p>
+                  <a:r>
+                    <a:rPr lang="en-US">
+                      <a:noFill/>
+                    </a:rPr>
+                    <a:t> </a:t>
+                  </a:r>
+                </a:p>
+              </p:txBody>
+            </p:sp>
+          </mc:Fallback>
+        </mc:AlternateContent>
+        <p:cxnSp>
+          <p:nvCxnSpPr>
+            <p:cNvPr id="46" name="Straight Arrow Connector 45"/>
+            <p:cNvCxnSpPr/>
+            <p:nvPr/>
+          </p:nvCxnSpPr>
+          <p:spPr>
+            <a:xfrm flipH="1">
+              <a:off x="9754691" y="2270000"/>
+              <a:ext cx="1" cy="612261"/>
+            </a:xfrm>
+            <a:prstGeom prst="straightConnector1">
+              <a:avLst/>
+            </a:prstGeom>
+            <a:ln w="57150">
+              <a:solidFill>
+                <a:schemeClr val="tx1"/>
+              </a:solidFill>
+              <a:tailEnd type="triangle"/>
+            </a:ln>
+          </p:spPr>
+          <p:style>
+            <a:lnRef idx="1">
+              <a:schemeClr val="accent1"/>
+            </a:lnRef>
+            <a:fillRef idx="0">
+              <a:schemeClr val="accent1"/>
+            </a:fillRef>
+            <a:effectRef idx="0">
+              <a:schemeClr val="accent1"/>
+            </a:effectRef>
+            <a:fontRef idx="minor">
+              <a:schemeClr val="tx1"/>
+            </a:fontRef>
+          </p:style>
+        </p:cxnSp>
+        <mc:AlternateContent xmlns:mc="http://schemas.openxmlformats.org/markup-compatibility/2006">
+          <mc:Choice xmlns:a14="http://schemas.microsoft.com/office/drawing/2010/main" Requires="a14">
+            <p:sp>
+              <p:nvSpPr>
+                <p:cNvPr id="47" name="TextBox 46"/>
+                <p:cNvSpPr txBox="1"/>
+                <p:nvPr/>
+              </p:nvSpPr>
+              <p:spPr>
+                <a:xfrm>
+                  <a:off x="9843705" y="2351887"/>
+                  <a:ext cx="341888" cy="345159"/>
+                </a:xfrm>
+                <a:prstGeom prst="rect">
+                  <a:avLst/>
+                </a:prstGeom>
+                <a:noFill/>
+              </p:spPr>
+              <p:txBody>
+                <a:bodyPr wrap="none" lIns="0" tIns="0" rIns="0" bIns="0" rtlCol="0">
+                  <a:spAutoFit/>
+                </a:bodyPr>
+                <a:lstStyle/>
+                <a:p>
+                  <a14:m>
+                    <m:oMathPara xmlns:m="http://schemas.openxmlformats.org/officeDocument/2006/math">
+                      <m:oMathParaPr>
+                        <m:jc m:val="centerGroup"/>
+                      </m:oMathParaPr>
+                      <m:oMath xmlns:m="http://schemas.openxmlformats.org/officeDocument/2006/math">
+                        <m:sSub>
+                          <m:sSubPr>
+                            <m:ctrlPr>
+                              <a:rPr lang="en-US" sz="2000" b="0" i="1" smtClean="0">
+                                <a:latin typeface="Cambria Math" panose="02040503050406030204" pitchFamily="18" charset="0"/>
+                                <a:cs typeface="Arial" panose="020B0604020202020204" pitchFamily="34" charset="0"/>
+                              </a:rPr>
+                            </m:ctrlPr>
+                          </m:sSubPr>
+                          <m:e>
+                            <m:acc>
+                              <m:accPr>
+                                <m:chr m:val="⃗"/>
+                                <m:ctrlPr>
+                                  <a:rPr lang="en-US" sz="2000" b="0" i="1" smtClean="0">
+                                    <a:latin typeface="Cambria Math" panose="02040503050406030204" pitchFamily="18" charset="0"/>
+                                    <a:cs typeface="Arial" panose="020B0604020202020204" pitchFamily="34" charset="0"/>
+                                  </a:rPr>
+                                </m:ctrlPr>
+                              </m:accPr>
+                              <m:e>
+                                <m:r>
+                                  <a:rPr lang="en-US" sz="2000" b="0" i="1" smtClean="0">
+                                    <a:latin typeface="Cambria Math" panose="02040503050406030204" pitchFamily="18" charset="0"/>
+                                    <a:cs typeface="Arial" panose="020B0604020202020204" pitchFamily="34" charset="0"/>
+                                  </a:rPr>
+                                  <m:t>𝐹</m:t>
+                                </m:r>
+                              </m:e>
+                            </m:acc>
+                          </m:e>
+                          <m:sub>
+                            <m:r>
+                              <a:rPr lang="en-US" sz="2000" b="0" i="1" smtClean="0">
+                                <a:latin typeface="Cambria Math" panose="02040503050406030204" pitchFamily="18" charset="0"/>
+                                <a:cs typeface="Arial" panose="020B0604020202020204" pitchFamily="34" charset="0"/>
+                              </a:rPr>
+                              <m:t>𝐸</m:t>
+                            </m:r>
+                          </m:sub>
+                        </m:sSub>
+                      </m:oMath>
+                    </m:oMathPara>
+                  </a14:m>
+                  <a:endParaRPr lang="en-US" sz="2000" dirty="0" smtClean="0">
+                    <a:latin typeface="Arial" panose="020B0604020202020204" pitchFamily="34" charset="0"/>
+                    <a:cs typeface="Arial" panose="020B0604020202020204" pitchFamily="34" charset="0"/>
+                  </a:endParaRPr>
+                </a:p>
+              </p:txBody>
+            </p:sp>
+          </mc:Choice>
+          <mc:Fallback>
+            <p:sp>
+              <p:nvSpPr>
+                <p:cNvPr id="47" name="TextBox 46"/>
+                <p:cNvSpPr txBox="1">
+                  <a:spLocks noRot="1" noChangeAspect="1" noMove="1" noResize="1" noEditPoints="1" noAdjustHandles="1" noChangeArrowheads="1" noChangeShapeType="1" noTextEdit="1"/>
+                </p:cNvSpPr>
+                <p:nvPr/>
+              </p:nvSpPr>
+              <p:spPr>
+                <a:xfrm>
+                  <a:off x="9843705" y="2351887"/>
+                  <a:ext cx="341888" cy="345159"/>
+                </a:xfrm>
+                <a:prstGeom prst="rect">
+                  <a:avLst/>
+                </a:prstGeom>
+                <a:blipFill>
+                  <a:blip r:embed="rId14"/>
+                  <a:stretch>
+                    <a:fillRect l="-16071" t="-35714" r="-62500" b="-17857"/>
+                  </a:stretch>
+                </a:blipFill>
+              </p:spPr>
+              <p:txBody>
+                <a:bodyPr/>
+                <a:lstStyle/>
+                <a:p>
+                  <a:r>
+                    <a:rPr lang="en-US">
+                      <a:noFill/>
+                    </a:rPr>
+                    <a:t> </a:t>
+                  </a:r>
+                </a:p>
+              </p:txBody>
+            </p:sp>
+          </mc:Fallback>
+        </mc:AlternateContent>
+      </p:grpSp>
     </p:spTree>
     <p:extLst>
       <p:ext uri="{BB962C8B-B14F-4D97-AF65-F5344CB8AC3E}">

</xml_diff>